<commit_message>
Upload the individual presentation
</commit_message>
<xml_diff>
--- a/ScholarSphere_Lakshminath_Presentation.pptx
+++ b/ScholarSphere_Lakshminath_Presentation.pptx
@@ -8,8 +8,9 @@
     <p:sldId id="256" r:id="rId5"/>
     <p:sldId id="268" r:id="rId6"/>
     <p:sldId id="263" r:id="rId7"/>
-    <p:sldId id="267" r:id="rId8"/>
-    <p:sldId id="269" r:id="rId9"/>
+    <p:sldId id="270" r:id="rId8"/>
+    <p:sldId id="267" r:id="rId9"/>
+    <p:sldId id="269" r:id="rId10"/>
   </p:sldIdLst>
   <p:sldSz cx="12192000" cy="6858000"/>
   <p:notesSz cx="6858000" cy="9144000"/>
@@ -294,7 +295,7 @@
             <a:fld id="{87DE6118-2437-4B30-8E3C-4D2BE6020583}" type="datetimeFigureOut">
               <a:rPr lang="en-US" dirty="0"/>
               <a:pPr/>
-              <a:t>4/29/2024</a:t>
+              <a:t>5/4/2024</a:t>
             </a:fld>
             <a:endParaRPr lang="en-US" dirty="0"/>
           </a:p>
@@ -620,7 +621,7 @@
           <a:p>
             <a:fld id="{87DE6118-2437-4B30-8E3C-4D2BE6020583}" type="datetimeFigureOut">
               <a:rPr lang="en-US" dirty="0"/>
-              <a:t>4/29/2024</a:t>
+              <a:t>5/4/2024</a:t>
             </a:fld>
             <a:endParaRPr lang="en-US" dirty="0"/>
           </a:p>
@@ -795,7 +796,7 @@
           <a:p>
             <a:fld id="{87DE6118-2437-4B30-8E3C-4D2BE6020583}" type="datetimeFigureOut">
               <a:rPr lang="en-US" dirty="0"/>
-              <a:t>4/29/2024</a:t>
+              <a:t>5/4/2024</a:t>
             </a:fld>
             <a:endParaRPr lang="en-US" dirty="0"/>
           </a:p>
@@ -960,7 +961,7 @@
           <a:p>
             <a:fld id="{87DE6118-2437-4B30-8E3C-4D2BE6020583}" type="datetimeFigureOut">
               <a:rPr lang="en-US" dirty="0"/>
-              <a:t>4/29/2024</a:t>
+              <a:t>5/4/2024</a:t>
             </a:fld>
             <a:endParaRPr lang="en-US" dirty="0"/>
           </a:p>
@@ -1233,7 +1234,7 @@
             <a:fld id="{87DE6118-2437-4B30-8E3C-4D2BE6020583}" type="datetimeFigureOut">
               <a:rPr lang="en-US" dirty="0"/>
               <a:pPr/>
-              <a:t>4/29/2024</a:t>
+              <a:t>5/4/2024</a:t>
             </a:fld>
             <a:endParaRPr lang="en-US" dirty="0"/>
           </a:p>
@@ -1623,7 +1624,7 @@
           <a:p>
             <a:fld id="{87DE6118-2437-4B30-8E3C-4D2BE6020583}" type="datetimeFigureOut">
               <a:rPr lang="en-US" dirty="0"/>
-              <a:t>4/29/2024</a:t>
+              <a:t>5/4/2024</a:t>
             </a:fld>
             <a:endParaRPr lang="en-US" dirty="0"/>
           </a:p>
@@ -2095,7 +2096,7 @@
           <a:p>
             <a:fld id="{87DE6118-2437-4B30-8E3C-4D2BE6020583}" type="datetimeFigureOut">
               <a:rPr lang="en-US" dirty="0"/>
-              <a:t>4/29/2024</a:t>
+              <a:t>5/4/2024</a:t>
             </a:fld>
             <a:endParaRPr lang="en-US" dirty="0"/>
           </a:p>
@@ -2208,7 +2209,7 @@
           <a:p>
             <a:fld id="{87DE6118-2437-4B30-8E3C-4D2BE6020583}" type="datetimeFigureOut">
               <a:rPr lang="en-US" dirty="0"/>
-              <a:t>4/29/2024</a:t>
+              <a:t>5/4/2024</a:t>
             </a:fld>
             <a:endParaRPr lang="en-US" dirty="0"/>
           </a:p>
@@ -2298,7 +2299,7 @@
           <a:p>
             <a:fld id="{87DE6118-2437-4B30-8E3C-4D2BE6020583}" type="datetimeFigureOut">
               <a:rPr lang="en-US" dirty="0"/>
-              <a:t>4/29/2024</a:t>
+              <a:t>5/4/2024</a:t>
             </a:fld>
             <a:endParaRPr lang="en-US" dirty="0"/>
           </a:p>
@@ -2640,7 +2641,7 @@
             <a:fld id="{87DE6118-2437-4B30-8E3C-4D2BE6020583}" type="datetimeFigureOut">
               <a:rPr lang="en-US" dirty="0"/>
               <a:pPr/>
-              <a:t>4/29/2024</a:t>
+              <a:t>5/4/2024</a:t>
             </a:fld>
             <a:endParaRPr lang="en-US" dirty="0"/>
           </a:p>
@@ -3025,7 +3026,7 @@
             <a:fld id="{87DE6118-2437-4B30-8E3C-4D2BE6020583}" type="datetimeFigureOut">
               <a:rPr lang="en-US" dirty="0"/>
               <a:pPr/>
-              <a:t>4/29/2024</a:t>
+              <a:t>5/4/2024</a:t>
             </a:fld>
             <a:endParaRPr lang="en-US" dirty="0"/>
           </a:p>
@@ -3300,7 +3301,7 @@
             <a:fld id="{87DE6118-2437-4B30-8E3C-4D2BE6020583}" type="datetimeFigureOut">
               <a:rPr lang="en-US" dirty="0"/>
               <a:pPr/>
-              <a:t>4/29/2024</a:t>
+              <a:t>5/4/2024</a:t>
             </a:fld>
             <a:endParaRPr lang="en-US" dirty="0"/>
           </a:p>
@@ -3794,6 +3795,14 @@
 <file path=ppt/slides/slide1.xml><?xml version="1.0" encoding="utf-8"?>
 <p:sld xmlns:a="http://schemas.openxmlformats.org/drawingml/2006/main" xmlns:r="http://schemas.openxmlformats.org/officeDocument/2006/relationships" xmlns:p="http://schemas.openxmlformats.org/presentationml/2006/main">
   <p:cSld>
+    <p:bg>
+      <p:bgPr>
+        <a:solidFill>
+          <a:schemeClr val="bg2"/>
+        </a:solidFill>
+        <a:effectLst/>
+      </p:bgPr>
+    </p:bg>
     <p:spTree>
       <p:nvGrpSpPr>
         <p:cNvPr id="1" name=""/>
@@ -3808,6 +3817,262 @@
           <a:chExt cx="0" cy="0"/>
         </a:xfrm>
       </p:grpSpPr>
+      <p:pic>
+        <p:nvPicPr>
+          <p:cNvPr id="5" name="Picture 4">
+            <a:extLst>
+              <a:ext uri="{FF2B5EF4-FFF2-40B4-BE49-F238E27FC236}">
+                <a16:creationId xmlns:a16="http://schemas.microsoft.com/office/drawing/2014/main" id="{DB591D67-C269-FC23-EBC7-1F3AEBAA0DA5}"/>
+              </a:ext>
+            </a:extLst>
+          </p:cNvPr>
+          <p:cNvPicPr>
+            <a:picLocks noChangeAspect="1"/>
+          </p:cNvPicPr>
+          <p:nvPr/>
+        </p:nvPicPr>
+        <p:blipFill rotWithShape="1">
+          <a:blip r:embed="rId2"/>
+          <a:srcRect t="8889"/>
+          <a:stretch/>
+        </p:blipFill>
+        <p:spPr>
+          <a:xfrm>
+            <a:off x="20" y="10"/>
+            <a:ext cx="12191980" cy="6859300"/>
+          </a:xfrm>
+          <a:prstGeom prst="rect">
+            <a:avLst/>
+          </a:prstGeom>
+        </p:spPr>
+      </p:pic>
+      <p:sp>
+        <p:nvSpPr>
+          <p:cNvPr id="10" name="Rectangle 9">
+            <a:extLst>
+              <a:ext uri="{FF2B5EF4-FFF2-40B4-BE49-F238E27FC236}">
+                <a16:creationId xmlns:a16="http://schemas.microsoft.com/office/drawing/2014/main" id="{EF1A96B9-F717-4812-9DB0-C99D994623B8}"/>
+              </a:ext>
+              <a:ext uri="{C183D7F6-B498-43B3-948B-1728B52AA6E4}">
+                <adec:decorative xmlns:adec="http://schemas.microsoft.com/office/drawing/2017/decorative" val="1"/>
+              </a:ext>
+            </a:extLst>
+          </p:cNvPr>
+          <p:cNvSpPr>
+            <a:spLocks noGrp="1" noRot="1" noChangeAspect="1" noMove="1" noResize="1" noEditPoints="1" noAdjustHandles="1" noChangeArrowheads="1" noChangeShapeType="1" noTextEdit="1"/>
+          </p:cNvSpPr>
+          <p:nvPr>
+            <p:extLst>
+              <p:ext uri="{386F3935-93C4-4BCD-93E2-E3B085C9AB24}">
+                <p16:designElem xmlns:p16="http://schemas.microsoft.com/office/powerpoint/2015/main" val="1"/>
+              </p:ext>
+            </p:extLst>
+          </p:nvPr>
+        </p:nvSpPr>
+        <p:spPr>
+          <a:xfrm>
+            <a:off x="1155560" y="1137137"/>
+            <a:ext cx="9867482" cy="4570327"/>
+          </a:xfrm>
+          <a:prstGeom prst="rect">
+            <a:avLst/>
+          </a:prstGeom>
+          <a:solidFill>
+            <a:schemeClr val="bg2">
+              <a:alpha val="80000"/>
+            </a:schemeClr>
+          </a:solidFill>
+          <a:ln>
+            <a:noFill/>
+          </a:ln>
+        </p:spPr>
+        <p:style>
+          <a:lnRef idx="2">
+            <a:schemeClr val="accent1">
+              <a:shade val="50000"/>
+            </a:schemeClr>
+          </a:lnRef>
+          <a:fillRef idx="1">
+            <a:schemeClr val="accent1"/>
+          </a:fillRef>
+          <a:effectRef idx="0">
+            <a:schemeClr val="accent1"/>
+          </a:effectRef>
+          <a:fontRef idx="minor">
+            <a:schemeClr val="lt1"/>
+          </a:fontRef>
+        </p:style>
+        <p:txBody>
+          <a:bodyPr rtlCol="0" anchor="ctr"/>
+          <a:lstStyle/>
+          <a:p>
+            <a:pPr algn="ctr"/>
+            <a:endParaRPr lang="en-US"/>
+          </a:p>
+        </p:txBody>
+      </p:sp>
+      <p:sp>
+        <p:nvSpPr>
+          <p:cNvPr id="12" name="Freeform 6">
+            <a:extLst>
+              <a:ext uri="{FF2B5EF4-FFF2-40B4-BE49-F238E27FC236}">
+                <a16:creationId xmlns:a16="http://schemas.microsoft.com/office/drawing/2014/main" id="{226038F9-8CE0-4A41-9EF0-3A27023DEF39}"/>
+              </a:ext>
+              <a:ext uri="{C183D7F6-B498-43B3-948B-1728B52AA6E4}">
+                <adec:decorative xmlns:adec="http://schemas.microsoft.com/office/drawing/2017/decorative" val="1"/>
+              </a:ext>
+            </a:extLst>
+          </p:cNvPr>
+          <p:cNvSpPr>
+            <a:spLocks noGrp="1" noRot="1" noChangeAspect="1" noMove="1" noResize="1" noEditPoints="1" noAdjustHandles="1" noChangeArrowheads="1" noChangeShapeType="1" noTextEdit="1"/>
+          </p:cNvSpPr>
+          <p:nvPr>
+            <p:extLst>
+              <p:ext uri="{386F3935-93C4-4BCD-93E2-E3B085C9AB24}">
+                <p16:designElem xmlns:p16="http://schemas.microsoft.com/office/powerpoint/2015/main" val="1"/>
+              </p:ext>
+            </p:extLst>
+          </p:nvPr>
+        </p:nvSpPr>
+        <p:spPr bwMode="auto">
+          <a:xfrm flipH="1" flipV="1">
+            <a:off x="752858" y="744469"/>
+            <a:ext cx="3275668" cy="4408488"/>
+          </a:xfrm>
+          <a:custGeom>
+            <a:avLst/>
+            <a:gdLst/>
+            <a:ahLst/>
+            <a:cxnLst/>
+            <a:rect l="l" t="t" r="r" b="b"/>
+            <a:pathLst>
+              <a:path w="10002" h="10000">
+                <a:moveTo>
+                  <a:pt x="8763" y="0"/>
+                </a:moveTo>
+                <a:lnTo>
+                  <a:pt x="10002" y="0"/>
+                </a:lnTo>
+                <a:lnTo>
+                  <a:pt x="10002" y="10000"/>
+                </a:lnTo>
+                <a:lnTo>
+                  <a:pt x="2" y="10000"/>
+                </a:lnTo>
+                <a:cubicBezTo>
+                  <a:pt x="-2" y="9698"/>
+                  <a:pt x="4" y="9427"/>
+                  <a:pt x="0" y="9125"/>
+                </a:cubicBezTo>
+                <a:lnTo>
+                  <a:pt x="8763" y="9128"/>
+                </a:lnTo>
+                <a:lnTo>
+                  <a:pt x="8763" y="0"/>
+                </a:lnTo>
+                <a:close/>
+              </a:path>
+            </a:pathLst>
+          </a:custGeom>
+          <a:solidFill>
+            <a:schemeClr val="tx2"/>
+          </a:solidFill>
+          <a:ln w="0">
+            <a:noFill/>
+            <a:prstDash val="solid"/>
+            <a:round/>
+            <a:headEnd/>
+            <a:tailEnd/>
+          </a:ln>
+        </p:spPr>
+        <p:txBody>
+          <a:bodyPr/>
+          <a:lstStyle/>
+          <a:p>
+            <a:endParaRPr lang="en-US"/>
+          </a:p>
+        </p:txBody>
+      </p:sp>
+      <p:sp>
+        <p:nvSpPr>
+          <p:cNvPr id="14" name="Freeform 6">
+            <a:extLst>
+              <a:ext uri="{FF2B5EF4-FFF2-40B4-BE49-F238E27FC236}">
+                <a16:creationId xmlns:a16="http://schemas.microsoft.com/office/drawing/2014/main" id="{BB5C5996-5C1E-4768-90AE-87BED835C607}"/>
+              </a:ext>
+              <a:ext uri="{C183D7F6-B498-43B3-948B-1728B52AA6E4}">
+                <adec:decorative xmlns:adec="http://schemas.microsoft.com/office/drawing/2017/decorative" val="1"/>
+              </a:ext>
+            </a:extLst>
+          </p:cNvPr>
+          <p:cNvSpPr>
+            <a:spLocks noGrp="1" noRot="1" noChangeAspect="1" noMove="1" noResize="1" noEditPoints="1" noAdjustHandles="1" noChangeArrowheads="1" noChangeShapeType="1" noTextEdit="1"/>
+          </p:cNvSpPr>
+          <p:nvPr>
+            <p:extLst>
+              <p:ext uri="{386F3935-93C4-4BCD-93E2-E3B085C9AB24}">
+                <p16:designElem xmlns:p16="http://schemas.microsoft.com/office/powerpoint/2015/main" val="1"/>
+              </p:ext>
+            </p:extLst>
+          </p:nvPr>
+        </p:nvSpPr>
+        <p:spPr bwMode="auto">
+          <a:xfrm>
+            <a:off x="8151962" y="1685652"/>
+            <a:ext cx="3275013" cy="4408488"/>
+          </a:xfrm>
+          <a:custGeom>
+            <a:avLst/>
+            <a:gdLst/>
+            <a:ahLst/>
+            <a:cxnLst/>
+            <a:rect l="l" t="t" r="r" b="b"/>
+            <a:pathLst>
+              <a:path w="10000" h="10000">
+                <a:moveTo>
+                  <a:pt x="8761" y="0"/>
+                </a:moveTo>
+                <a:lnTo>
+                  <a:pt x="10000" y="0"/>
+                </a:lnTo>
+                <a:lnTo>
+                  <a:pt x="10000" y="10000"/>
+                </a:lnTo>
+                <a:lnTo>
+                  <a:pt x="0" y="10000"/>
+                </a:lnTo>
+                <a:lnTo>
+                  <a:pt x="0" y="9126"/>
+                </a:lnTo>
+                <a:lnTo>
+                  <a:pt x="8761" y="9127"/>
+                </a:lnTo>
+                <a:lnTo>
+                  <a:pt x="8761" y="0"/>
+                </a:lnTo>
+                <a:close/>
+              </a:path>
+            </a:pathLst>
+          </a:custGeom>
+          <a:solidFill>
+            <a:schemeClr val="tx2"/>
+          </a:solidFill>
+          <a:ln w="0">
+            <a:noFill/>
+            <a:prstDash val="solid"/>
+            <a:round/>
+            <a:headEnd/>
+            <a:tailEnd/>
+          </a:ln>
+        </p:spPr>
+        <p:txBody>
+          <a:bodyPr/>
+          <a:lstStyle/>
+          <a:p>
+            <a:endParaRPr lang="en-US"/>
+          </a:p>
+        </p:txBody>
+      </p:sp>
       <p:sp>
         <p:nvSpPr>
           <p:cNvPr id="2" name="Title 1">
@@ -3824,16 +4089,22 @@
             <p:ph type="ctrTitle"/>
           </p:nvPr>
         </p:nvSpPr>
-        <p:spPr/>
-        <p:txBody>
-          <a:bodyPr/>
+        <p:spPr>
+          <a:xfrm>
+            <a:off x="1915128" y="1788454"/>
+            <a:ext cx="8361229" cy="2098226"/>
+          </a:xfrm>
+        </p:spPr>
+        <p:txBody>
+          <a:bodyPr>
+            <a:normAutofit/>
+          </a:bodyPr>
           <a:lstStyle/>
           <a:p>
             <a:r>
-              <a:rPr lang="en-IN" dirty="0" err="1"/>
+              <a:rPr lang="en-IN"/>
               <a:t>scholarsphere</a:t>
             </a:r>
-            <a:endParaRPr lang="en-IN" dirty="0"/>
           </a:p>
         </p:txBody>
       </p:sp>
@@ -3853,13 +4124,29 @@
             <p:ph type="subTitle" idx="1"/>
           </p:nvPr>
         </p:nvSpPr>
-        <p:spPr/>
-        <p:txBody>
-          <a:bodyPr/>
+        <p:spPr>
+          <a:xfrm>
+            <a:off x="2679906" y="3956279"/>
+            <a:ext cx="6831673" cy="1086237"/>
+          </a:xfrm>
+        </p:spPr>
+        <p:txBody>
+          <a:bodyPr>
+            <a:normAutofit/>
+          </a:bodyPr>
           <a:lstStyle/>
           <a:p>
-            <a:r>
-              <a:rPr lang="en-IN" dirty="0"/>
+            <a:pPr>
+              <a:spcAft>
+                <a:spcPts val="600"/>
+              </a:spcAft>
+            </a:pPr>
+            <a:r>
+              <a:rPr lang="en-IN">
+                <a:solidFill>
+                  <a:srgbClr val="191B0E"/>
+                </a:solidFill>
+              </a:rPr>
               <a:t>Lakshminath - Group 20</a:t>
             </a:r>
           </a:p>
@@ -3917,9 +4204,10 @@
           <a:lstStyle/>
           <a:p>
             <a:r>
-              <a:rPr lang="en-IN" dirty="0"/>
+              <a:rPr lang="en-IN"/>
               <a:t>Overall Sprint Issues</a:t>
             </a:r>
+            <a:endParaRPr lang="en-IN" dirty="0"/>
           </a:p>
         </p:txBody>
       </p:sp>
@@ -3947,7 +4235,7 @@
         </p:blipFill>
         <p:spPr>
           <a:xfrm>
-            <a:off x="1371600" y="2080727"/>
+            <a:off x="2445721" y="1821181"/>
             <a:ext cx="9601200" cy="2705877"/>
           </a:xfrm>
         </p:spPr>
@@ -4009,9 +4297,10 @@
           <a:lstStyle/>
           <a:p>
             <a:r>
-              <a:rPr lang="en-IN" dirty="0"/>
+              <a:rPr lang="en-IN"/>
               <a:t>Sprint Overview</a:t>
             </a:r>
+            <a:endParaRPr lang="en-IN" dirty="0"/>
           </a:p>
         </p:txBody>
       </p:sp>
@@ -4031,7 +4320,7 @@
             <p:ph idx="1"/>
             <p:extLst>
               <p:ext uri="{D42A27DB-BD31-4B8C-83A1-F6EECF244321}">
-                <p14:modId xmlns:p14="http://schemas.microsoft.com/office/powerpoint/2010/main" val="449710317"/>
+                <p14:modId xmlns:p14="http://schemas.microsoft.com/office/powerpoint/2010/main" val="1078643842"/>
               </p:ext>
             </p:extLst>
           </p:nvPr>
@@ -4083,9 +4372,10 @@
                     <a:lstStyle/>
                     <a:p>
                       <a:r>
-                        <a:rPr lang="en-IN" dirty="0"/>
+                        <a:rPr lang="en-IN"/>
                         <a:t>Sprint</a:t>
                       </a:r>
+                      <a:endParaRPr lang="en-IN" dirty="0"/>
                     </a:p>
                   </a:txBody>
                   <a:tcPr/>
@@ -4096,9 +4386,10 @@
                     <a:lstStyle/>
                     <a:p>
                       <a:r>
-                        <a:rPr lang="en-IN" dirty="0"/>
+                        <a:rPr lang="en-IN"/>
                         <a:t>Number of stories closed</a:t>
                       </a:r>
+                      <a:endParaRPr lang="en-IN" dirty="0"/>
                     </a:p>
                   </a:txBody>
                   <a:tcPr/>
@@ -4109,9 +4400,10 @@
                     <a:lstStyle/>
                     <a:p>
                       <a:r>
-                        <a:rPr lang="en-IN" dirty="0"/>
+                        <a:rPr lang="en-IN"/>
                         <a:t>Number of stories rolled over</a:t>
                       </a:r>
+                      <a:endParaRPr lang="en-IN" dirty="0"/>
                     </a:p>
                   </a:txBody>
                   <a:tcPr/>
@@ -4122,9 +4414,10 @@
                     <a:lstStyle/>
                     <a:p>
                       <a:r>
-                        <a:rPr lang="en-IN" dirty="0"/>
+                        <a:rPr lang="en-IN"/>
                         <a:t>Story points</a:t>
                       </a:r>
+                      <a:endParaRPr lang="en-IN" dirty="0"/>
                     </a:p>
                   </a:txBody>
                   <a:tcPr/>
@@ -4142,9 +4435,10 @@
                     <a:lstStyle/>
                     <a:p>
                       <a:r>
-                        <a:rPr lang="en-IN" dirty="0"/>
+                        <a:rPr lang="en-IN"/>
                         <a:t>Sprint 1</a:t>
                       </a:r>
+                      <a:endParaRPr lang="en-IN" dirty="0"/>
                     </a:p>
                   </a:txBody>
                   <a:tcPr/>
@@ -4155,9 +4449,10 @@
                     <a:lstStyle/>
                     <a:p>
                       <a:r>
-                        <a:rPr lang="en-IN" dirty="0"/>
+                        <a:rPr lang="en-IN"/>
                         <a:t>1</a:t>
                       </a:r>
+                      <a:endParaRPr lang="en-IN" dirty="0"/>
                     </a:p>
                   </a:txBody>
                   <a:tcPr/>
@@ -4168,9 +4463,10 @@
                     <a:lstStyle/>
                     <a:p>
                       <a:r>
-                        <a:rPr lang="en-IN" dirty="0"/>
+                        <a:rPr lang="en-IN"/>
                         <a:t>0</a:t>
                       </a:r>
+                      <a:endParaRPr lang="en-IN" dirty="0"/>
                     </a:p>
                   </a:txBody>
                   <a:tcPr/>
@@ -4181,9 +4477,10 @@
                     <a:lstStyle/>
                     <a:p>
                       <a:r>
-                        <a:rPr lang="en-IN" dirty="0"/>
+                        <a:rPr lang="en-IN"/>
                         <a:t>6</a:t>
                       </a:r>
+                      <a:endParaRPr lang="en-IN" dirty="0"/>
                     </a:p>
                   </a:txBody>
                   <a:tcPr/>
@@ -4201,9 +4498,10 @@
                     <a:lstStyle/>
                     <a:p>
                       <a:r>
-                        <a:rPr lang="en-IN" dirty="0"/>
+                        <a:rPr lang="en-IN"/>
                         <a:t>Sprint 2</a:t>
                       </a:r>
+                      <a:endParaRPr lang="en-IN" dirty="0"/>
                     </a:p>
                   </a:txBody>
                   <a:tcPr/>
@@ -4214,9 +4512,10 @@
                     <a:lstStyle/>
                     <a:p>
                       <a:r>
-                        <a:rPr lang="en-IN" dirty="0"/>
+                        <a:rPr lang="en-IN"/>
                         <a:t>2</a:t>
                       </a:r>
+                      <a:endParaRPr lang="en-IN" dirty="0"/>
                     </a:p>
                   </a:txBody>
                   <a:tcPr/>
@@ -4227,9 +4526,10 @@
                     <a:lstStyle/>
                     <a:p>
                       <a:r>
-                        <a:rPr lang="en-IN" dirty="0"/>
+                        <a:rPr lang="en-IN"/>
                         <a:t>0</a:t>
                       </a:r>
+                      <a:endParaRPr lang="en-IN" dirty="0"/>
                     </a:p>
                   </a:txBody>
                   <a:tcPr/>
@@ -4240,9 +4540,10 @@
                     <a:lstStyle/>
                     <a:p>
                       <a:r>
-                        <a:rPr lang="en-IN" dirty="0"/>
+                        <a:rPr lang="en-IN"/>
                         <a:t>7</a:t>
                       </a:r>
+                      <a:endParaRPr lang="en-IN" dirty="0"/>
                     </a:p>
                   </a:txBody>
                   <a:tcPr/>
@@ -4260,9 +4561,10 @@
                     <a:lstStyle/>
                     <a:p>
                       <a:r>
-                        <a:rPr lang="en-IN" dirty="0"/>
+                        <a:rPr lang="en-IN"/>
                         <a:t>Sprint 3</a:t>
                       </a:r>
+                      <a:endParaRPr lang="en-IN" dirty="0"/>
                     </a:p>
                   </a:txBody>
                   <a:tcPr/>
@@ -4273,9 +4575,10 @@
                     <a:lstStyle/>
                     <a:p>
                       <a:r>
-                        <a:rPr lang="en-IN" dirty="0"/>
+                        <a:rPr lang="en-IN"/>
                         <a:t>1</a:t>
                       </a:r>
+                      <a:endParaRPr lang="en-IN" dirty="0"/>
                     </a:p>
                   </a:txBody>
                   <a:tcPr/>
@@ -4286,9 +4589,10 @@
                     <a:lstStyle/>
                     <a:p>
                       <a:r>
-                        <a:rPr lang="en-IN" dirty="0"/>
+                        <a:rPr lang="en-IN"/>
                         <a:t>0</a:t>
                       </a:r>
+                      <a:endParaRPr lang="en-IN" dirty="0"/>
                     </a:p>
                   </a:txBody>
                   <a:tcPr/>
@@ -4299,9 +4603,10 @@
                     <a:lstStyle/>
                     <a:p>
                       <a:r>
-                        <a:rPr lang="en-IN" dirty="0"/>
+                        <a:rPr lang="en-IN"/>
                         <a:t>6</a:t>
                       </a:r>
+                      <a:endParaRPr lang="en-IN" dirty="0"/>
                     </a:p>
                   </a:txBody>
                   <a:tcPr/>
@@ -4319,9 +4624,10 @@
                     <a:lstStyle/>
                     <a:p>
                       <a:r>
-                        <a:rPr lang="en-IN" dirty="0"/>
+                        <a:rPr lang="en-IN"/>
                         <a:t>Sprint 4</a:t>
                       </a:r>
+                      <a:endParaRPr lang="en-IN" dirty="0"/>
                     </a:p>
                   </a:txBody>
                   <a:tcPr/>
@@ -4332,9 +4638,10 @@
                     <a:lstStyle/>
                     <a:p>
                       <a:r>
-                        <a:rPr lang="en-IN" dirty="0"/>
+                        <a:rPr lang="en-IN"/>
                         <a:t>2</a:t>
                       </a:r>
+                      <a:endParaRPr lang="en-IN" dirty="0"/>
                     </a:p>
                   </a:txBody>
                   <a:tcPr/>
@@ -4345,9 +4652,10 @@
                     <a:lstStyle/>
                     <a:p>
                       <a:r>
-                        <a:rPr lang="en-IN" dirty="0"/>
+                        <a:rPr lang="en-IN"/>
                         <a:t>0</a:t>
                       </a:r>
+                      <a:endParaRPr lang="en-IN" dirty="0"/>
                     </a:p>
                   </a:txBody>
                   <a:tcPr/>
@@ -4358,9 +4666,10 @@
                     <a:lstStyle/>
                     <a:p>
                       <a:r>
-                        <a:rPr lang="en-IN" dirty="0"/>
+                        <a:rPr lang="en-IN"/>
                         <a:t>7</a:t>
                       </a:r>
+                      <a:endParaRPr lang="en-IN" dirty="0"/>
                     </a:p>
                   </a:txBody>
                   <a:tcPr/>
@@ -4378,9 +4687,10 @@
                     <a:lstStyle/>
                     <a:p>
                       <a:r>
-                        <a:rPr lang="en-IN" dirty="0"/>
+                        <a:rPr lang="en-IN"/>
                         <a:t>Sprint 5</a:t>
                       </a:r>
+                      <a:endParaRPr lang="en-IN" dirty="0"/>
                     </a:p>
                   </a:txBody>
                   <a:tcPr/>
@@ -4391,9 +4701,10 @@
                     <a:lstStyle/>
                     <a:p>
                       <a:r>
-                        <a:rPr lang="en-IN" dirty="0"/>
+                        <a:rPr lang="en-IN"/>
                         <a:t>2</a:t>
                       </a:r>
+                      <a:endParaRPr lang="en-IN" dirty="0"/>
                     </a:p>
                   </a:txBody>
                   <a:tcPr/>
@@ -4404,9 +4715,10 @@
                     <a:lstStyle/>
                     <a:p>
                       <a:r>
-                        <a:rPr lang="en-IN" dirty="0"/>
+                        <a:rPr lang="en-IN"/>
                         <a:t>0</a:t>
                       </a:r>
+                      <a:endParaRPr lang="en-IN" dirty="0"/>
                     </a:p>
                   </a:txBody>
                   <a:tcPr/>
@@ -4417,9 +4729,10 @@
                     <a:lstStyle/>
                     <a:p>
                       <a:r>
-                        <a:rPr lang="en-IN" dirty="0"/>
+                        <a:rPr lang="en-IN"/>
                         <a:t>8</a:t>
                       </a:r>
+                      <a:endParaRPr lang="en-IN" dirty="0"/>
                     </a:p>
                   </a:txBody>
                   <a:tcPr/>
@@ -4437,9 +4750,10 @@
                     <a:lstStyle/>
                     <a:p>
                       <a:r>
-                        <a:rPr lang="en-IN" dirty="0"/>
+                        <a:rPr lang="en-IN"/>
                         <a:t>Sprint 6</a:t>
                       </a:r>
+                      <a:endParaRPr lang="en-IN" dirty="0"/>
                     </a:p>
                   </a:txBody>
                   <a:tcPr/>
@@ -4450,9 +4764,10 @@
                     <a:lstStyle/>
                     <a:p>
                       <a:r>
-                        <a:rPr lang="en-IN" dirty="0"/>
+                        <a:rPr lang="en-IN"/>
                         <a:t>2</a:t>
                       </a:r>
+                      <a:endParaRPr lang="en-IN" dirty="0"/>
                     </a:p>
                   </a:txBody>
                   <a:tcPr/>
@@ -4463,9 +4778,10 @@
                     <a:lstStyle/>
                     <a:p>
                       <a:r>
-                        <a:rPr lang="en-IN" dirty="0"/>
+                        <a:rPr lang="en-IN"/>
                         <a:t>0</a:t>
                       </a:r>
+                      <a:endParaRPr lang="en-IN" dirty="0"/>
                     </a:p>
                   </a:txBody>
                   <a:tcPr/>
@@ -4476,9 +4792,10 @@
                     <a:lstStyle/>
                     <a:p>
                       <a:r>
-                        <a:rPr lang="en-IN" dirty="0"/>
+                        <a:rPr lang="en-IN"/>
                         <a:t>6</a:t>
                       </a:r>
+                      <a:endParaRPr lang="en-IN" dirty="0"/>
                     </a:p>
                   </a:txBody>
                   <a:tcPr/>
@@ -4496,9 +4813,10 @@
                     <a:lstStyle/>
                     <a:p>
                       <a:r>
-                        <a:rPr lang="en-IN" dirty="0"/>
+                        <a:rPr lang="en-IN"/>
                         <a:t>Sprint 7</a:t>
                       </a:r>
+                      <a:endParaRPr lang="en-IN" dirty="0"/>
                     </a:p>
                   </a:txBody>
                   <a:tcPr/>
@@ -4618,6 +4936,14 @@
 <file path=ppt/slides/slide4.xml><?xml version="1.0" encoding="utf-8"?>
 <p:sld xmlns:a="http://schemas.openxmlformats.org/drawingml/2006/main" xmlns:r="http://schemas.openxmlformats.org/officeDocument/2006/relationships" xmlns:p="http://schemas.openxmlformats.org/presentationml/2006/main">
   <p:cSld>
+    <p:bg>
+      <p:bgPr>
+        <a:solidFill>
+          <a:schemeClr val="bg2"/>
+        </a:solidFill>
+        <a:effectLst/>
+      </p:bgPr>
+    </p:bg>
     <p:spTree>
       <p:nvGrpSpPr>
         <p:cNvPr id="1" name=""/>
@@ -4632,12 +4958,262 @@
           <a:chExt cx="0" cy="0"/>
         </a:xfrm>
       </p:grpSpPr>
+      <p:grpSp>
+        <p:nvGrpSpPr>
+          <p:cNvPr id="41" name="Group 40">
+            <a:extLst>
+              <a:ext uri="{FF2B5EF4-FFF2-40B4-BE49-F238E27FC236}">
+                <a16:creationId xmlns:a16="http://schemas.microsoft.com/office/drawing/2014/main" id="{449BC34D-9C23-4D6D-8213-1F471AF85B3F}"/>
+              </a:ext>
+              <a:ext uri="{C183D7F6-B498-43B3-948B-1728B52AA6E4}">
+                <adec:decorative xmlns:adec="http://schemas.microsoft.com/office/drawing/2017/decorative" val="1"/>
+              </a:ext>
+            </a:extLst>
+          </p:cNvPr>
+          <p:cNvGrpSpPr>
+            <a:grpSpLocks noGrp="1" noUngrp="1" noRot="1" noChangeAspect="1" noMove="1" noResize="1"/>
+          </p:cNvGrpSpPr>
+          <p:nvPr>
+            <p:extLst>
+              <p:ext uri="{386F3935-93C4-4BCD-93E2-E3B085C9AB24}">
+                <p16:designElem xmlns:p16="http://schemas.microsoft.com/office/powerpoint/2015/main" val="1"/>
+              </p:ext>
+            </p:extLst>
+          </p:nvPr>
+        </p:nvGrpSpPr>
+        <p:grpSpPr>
+          <a:xfrm>
+            <a:off x="752858" y="744469"/>
+            <a:ext cx="10674117" cy="5349671"/>
+            <a:chOff x="752858" y="744469"/>
+            <a:chExt cx="10674117" cy="5349671"/>
+          </a:xfrm>
+        </p:grpSpPr>
+        <p:sp>
+          <p:nvSpPr>
+            <p:cNvPr id="42" name="Freeform 6">
+              <a:extLst>
+                <a:ext uri="{FF2B5EF4-FFF2-40B4-BE49-F238E27FC236}">
+                  <a16:creationId xmlns:a16="http://schemas.microsoft.com/office/drawing/2014/main" id="{FA0F5D6C-5025-4D7E-82DD-C2C6FDA1E759}"/>
+                </a:ext>
+                <a:ext uri="{C183D7F6-B498-43B3-948B-1728B52AA6E4}">
+                  <adec:decorative xmlns:adec="http://schemas.microsoft.com/office/drawing/2017/decorative" val="1"/>
+                </a:ext>
+              </a:extLst>
+            </p:cNvPr>
+            <p:cNvSpPr/>
+            <p:nvPr>
+              <p:extLst>
+                <p:ext uri="{386F3935-93C4-4BCD-93E2-E3B085C9AB24}">
+                  <p16:designElem xmlns:p16="http://schemas.microsoft.com/office/powerpoint/2015/main" val="1"/>
+                </p:ext>
+              </p:extLst>
+            </p:nvPr>
+          </p:nvSpPr>
+          <p:spPr bwMode="auto">
+            <a:xfrm>
+              <a:off x="8151962" y="1685652"/>
+              <a:ext cx="3275013" cy="4408488"/>
+            </a:xfrm>
+            <a:custGeom>
+              <a:avLst/>
+              <a:gdLst/>
+              <a:ahLst/>
+              <a:cxnLst/>
+              <a:rect l="l" t="t" r="r" b="b"/>
+              <a:pathLst>
+                <a:path w="10000" h="10000">
+                  <a:moveTo>
+                    <a:pt x="8761" y="0"/>
+                  </a:moveTo>
+                  <a:lnTo>
+                    <a:pt x="10000" y="0"/>
+                  </a:lnTo>
+                  <a:lnTo>
+                    <a:pt x="10000" y="10000"/>
+                  </a:lnTo>
+                  <a:lnTo>
+                    <a:pt x="0" y="10000"/>
+                  </a:lnTo>
+                  <a:lnTo>
+                    <a:pt x="0" y="9126"/>
+                  </a:lnTo>
+                  <a:lnTo>
+                    <a:pt x="8761" y="9127"/>
+                  </a:lnTo>
+                  <a:lnTo>
+                    <a:pt x="8761" y="0"/>
+                  </a:lnTo>
+                  <a:close/>
+                </a:path>
+              </a:pathLst>
+            </a:custGeom>
+            <a:solidFill>
+              <a:schemeClr val="tx2"/>
+            </a:solidFill>
+            <a:ln w="0">
+              <a:noFill/>
+              <a:prstDash val="solid"/>
+              <a:round/>
+              <a:headEnd/>
+              <a:tailEnd/>
+            </a:ln>
+          </p:spPr>
+          <p:txBody>
+            <a:bodyPr/>
+            <a:lstStyle/>
+            <a:p>
+              <a:endParaRPr lang="en-US"/>
+            </a:p>
+          </p:txBody>
+        </p:sp>
+        <p:sp>
+          <p:nvSpPr>
+            <p:cNvPr id="43" name="Freeform 6">
+              <a:extLst>
+                <a:ext uri="{FF2B5EF4-FFF2-40B4-BE49-F238E27FC236}">
+                  <a16:creationId xmlns:a16="http://schemas.microsoft.com/office/drawing/2014/main" id="{E2AF2C17-4AB4-4402-B84B-129EF95D161C}"/>
+                </a:ext>
+                <a:ext uri="{C183D7F6-B498-43B3-948B-1728B52AA6E4}">
+                  <adec:decorative xmlns:adec="http://schemas.microsoft.com/office/drawing/2017/decorative" val="1"/>
+                </a:ext>
+              </a:extLst>
+            </p:cNvPr>
+            <p:cNvSpPr/>
+            <p:nvPr>
+              <p:extLst>
+                <p:ext uri="{386F3935-93C4-4BCD-93E2-E3B085C9AB24}">
+                  <p16:designElem xmlns:p16="http://schemas.microsoft.com/office/powerpoint/2015/main" val="1"/>
+                </p:ext>
+              </p:extLst>
+            </p:nvPr>
+          </p:nvSpPr>
+          <p:spPr bwMode="auto">
+            <a:xfrm flipH="1" flipV="1">
+              <a:off x="752858" y="744469"/>
+              <a:ext cx="3275668" cy="4408488"/>
+            </a:xfrm>
+            <a:custGeom>
+              <a:avLst/>
+              <a:gdLst/>
+              <a:ahLst/>
+              <a:cxnLst/>
+              <a:rect l="l" t="t" r="r" b="b"/>
+              <a:pathLst>
+                <a:path w="10002" h="10000">
+                  <a:moveTo>
+                    <a:pt x="8763" y="0"/>
+                  </a:moveTo>
+                  <a:lnTo>
+                    <a:pt x="10002" y="0"/>
+                  </a:lnTo>
+                  <a:lnTo>
+                    <a:pt x="10002" y="10000"/>
+                  </a:lnTo>
+                  <a:lnTo>
+                    <a:pt x="2" y="10000"/>
+                  </a:lnTo>
+                  <a:cubicBezTo>
+                    <a:pt x="-2" y="9698"/>
+                    <a:pt x="4" y="9427"/>
+                    <a:pt x="0" y="9125"/>
+                  </a:cubicBezTo>
+                  <a:lnTo>
+                    <a:pt x="8763" y="9128"/>
+                  </a:lnTo>
+                  <a:lnTo>
+                    <a:pt x="8763" y="0"/>
+                  </a:lnTo>
+                  <a:close/>
+                </a:path>
+              </a:pathLst>
+            </a:custGeom>
+            <a:solidFill>
+              <a:schemeClr val="tx2"/>
+            </a:solidFill>
+            <a:ln w="0">
+              <a:noFill/>
+              <a:prstDash val="solid"/>
+              <a:round/>
+              <a:headEnd/>
+              <a:tailEnd/>
+            </a:ln>
+          </p:spPr>
+          <p:txBody>
+            <a:bodyPr/>
+            <a:lstStyle/>
+            <a:p>
+              <a:endParaRPr lang="en-US"/>
+            </a:p>
+          </p:txBody>
+        </p:sp>
+      </p:grpSp>
+      <p:sp useBgFill="1">
+        <p:nvSpPr>
+          <p:cNvPr id="45" name="Rectangle 44">
+            <a:extLst>
+              <a:ext uri="{FF2B5EF4-FFF2-40B4-BE49-F238E27FC236}">
+                <a16:creationId xmlns:a16="http://schemas.microsoft.com/office/drawing/2014/main" id="{1F9A0C1C-8ABC-401B-8FE9-AC9327C4C587}"/>
+              </a:ext>
+              <a:ext uri="{C183D7F6-B498-43B3-948B-1728B52AA6E4}">
+                <adec:decorative xmlns:adec="http://schemas.microsoft.com/office/drawing/2017/decorative" val="1"/>
+              </a:ext>
+            </a:extLst>
+          </p:cNvPr>
+          <p:cNvSpPr>
+            <a:spLocks noGrp="1" noRot="1" noChangeAspect="1" noMove="1" noResize="1" noEditPoints="1" noAdjustHandles="1" noChangeArrowheads="1" noChangeShapeType="1" noTextEdit="1"/>
+          </p:cNvSpPr>
+          <p:nvPr>
+            <p:extLst>
+              <p:ext uri="{386F3935-93C4-4BCD-93E2-E3B085C9AB24}">
+                <p16:designElem xmlns:p16="http://schemas.microsoft.com/office/powerpoint/2015/main" val="1"/>
+              </p:ext>
+            </p:extLst>
+          </p:nvPr>
+        </p:nvSpPr>
+        <p:spPr>
+          <a:xfrm>
+            <a:off x="0" y="0"/>
+            <a:ext cx="12192000" cy="6858000"/>
+          </a:xfrm>
+          <a:prstGeom prst="rect">
+            <a:avLst/>
+          </a:prstGeom>
+          <a:ln>
+            <a:noFill/>
+          </a:ln>
+        </p:spPr>
+        <p:style>
+          <a:lnRef idx="2">
+            <a:schemeClr val="accent1">
+              <a:shade val="50000"/>
+            </a:schemeClr>
+          </a:lnRef>
+          <a:fillRef idx="1001">
+            <a:schemeClr val="lt2"/>
+          </a:fillRef>
+          <a:effectRef idx="0">
+            <a:schemeClr val="accent1"/>
+          </a:effectRef>
+          <a:fontRef idx="minor">
+            <a:schemeClr val="lt1"/>
+          </a:fontRef>
+        </p:style>
+        <p:txBody>
+          <a:bodyPr rtlCol="0" anchor="ctr"/>
+          <a:lstStyle/>
+          <a:p>
+            <a:pPr algn="ctr"/>
+            <a:endParaRPr lang="en-US"/>
+          </a:p>
+        </p:txBody>
+      </p:sp>
       <p:sp>
         <p:nvSpPr>
           <p:cNvPr id="2" name="Title 1">
             <a:extLst>
               <a:ext uri="{FF2B5EF4-FFF2-40B4-BE49-F238E27FC236}">
-                <a16:creationId xmlns:a16="http://schemas.microsoft.com/office/drawing/2014/main" id="{2BFB4512-644D-2E46-94FC-8C3AA76B1BA2}"/>
+                <a16:creationId xmlns:a16="http://schemas.microsoft.com/office/drawing/2014/main" id="{6CE2401D-5A97-AB91-8A06-F4E8AFAE4CD0}"/>
               </a:ext>
             </a:extLst>
           </p:cNvPr>
@@ -4648,56 +5224,224 @@
             <p:ph type="title"/>
           </p:nvPr>
         </p:nvSpPr>
-        <p:spPr/>
-        <p:txBody>
-          <a:bodyPr/>
+        <p:spPr>
+          <a:xfrm>
+            <a:off x="8154186" y="634028"/>
+            <a:ext cx="3355942" cy="3732835"/>
+          </a:xfrm>
+        </p:spPr>
+        <p:txBody>
+          <a:bodyPr vert="horz" lIns="91440" tIns="45720" rIns="91440" bIns="45720" rtlCol="0" anchor="b">
+            <a:normAutofit/>
+          </a:bodyPr>
           <a:lstStyle/>
           <a:p>
-            <a:r>
-              <a:rPr lang="en-IN" dirty="0"/>
-              <a:t>Jira Link For Project</a:t>
-            </a:r>
-          </a:p>
-        </p:txBody>
-      </p:sp>
-      <p:sp>
-        <p:nvSpPr>
-          <p:cNvPr id="4" name="Content Placeholder 3">
+            <a:pPr algn="ctr"/>
+            <a:r>
+              <a:rPr lang="en-US" sz="3300" cap="all"/>
+              <a:t>UML Diagram for ScholarSphere</a:t>
+            </a:r>
+          </a:p>
+        </p:txBody>
+      </p:sp>
+      <p:sp>
+        <p:nvSpPr>
+          <p:cNvPr id="47" name="Freeform 6">
             <a:extLst>
               <a:ext uri="{FF2B5EF4-FFF2-40B4-BE49-F238E27FC236}">
-                <a16:creationId xmlns:a16="http://schemas.microsoft.com/office/drawing/2014/main" id="{7AB87132-670F-E38B-84D8-85C4CDB9DD6E}"/>
+                <a16:creationId xmlns:a16="http://schemas.microsoft.com/office/drawing/2014/main" id="{BA5783C3-2F96-40A7-A24F-30CB07AA3928}"/>
+              </a:ext>
+              <a:ext uri="{C183D7F6-B498-43B3-948B-1728B52AA6E4}">
+                <adec:decorative xmlns:adec="http://schemas.microsoft.com/office/drawing/2017/decorative" val="1"/>
               </a:ext>
             </a:extLst>
           </p:cNvPr>
           <p:cNvSpPr>
-            <a:spLocks noGrp="1"/>
-          </p:cNvSpPr>
-          <p:nvPr>
-            <p:ph idx="1"/>
-          </p:nvPr>
-        </p:nvSpPr>
-        <p:spPr/>
+            <a:spLocks noGrp="1" noRot="1" noChangeAspect="1" noMove="1" noResize="1" noEditPoints="1" noAdjustHandles="1" noChangeArrowheads="1" noChangeShapeType="1" noTextEdit="1"/>
+          </p:cNvSpPr>
+          <p:nvPr>
+            <p:extLst>
+              <p:ext uri="{386F3935-93C4-4BCD-93E2-E3B085C9AB24}">
+                <p16:designElem xmlns:p16="http://schemas.microsoft.com/office/powerpoint/2015/main" val="1"/>
+              </p:ext>
+            </p:extLst>
+          </p:nvPr>
+        </p:nvSpPr>
+        <p:spPr bwMode="auto">
+          <a:xfrm flipH="1" flipV="1">
+            <a:off x="649163" y="634028"/>
+            <a:ext cx="3275668" cy="4408488"/>
+          </a:xfrm>
+          <a:custGeom>
+            <a:avLst/>
+            <a:gdLst/>
+            <a:ahLst/>
+            <a:cxnLst/>
+            <a:rect l="l" t="t" r="r" b="b"/>
+            <a:pathLst>
+              <a:path w="10002" h="10000">
+                <a:moveTo>
+                  <a:pt x="8763" y="0"/>
+                </a:moveTo>
+                <a:lnTo>
+                  <a:pt x="10002" y="0"/>
+                </a:lnTo>
+                <a:lnTo>
+                  <a:pt x="10002" y="10000"/>
+                </a:lnTo>
+                <a:lnTo>
+                  <a:pt x="2" y="10000"/>
+                </a:lnTo>
+                <a:cubicBezTo>
+                  <a:pt x="-2" y="9698"/>
+                  <a:pt x="4" y="9427"/>
+                  <a:pt x="0" y="9125"/>
+                </a:cubicBezTo>
+                <a:lnTo>
+                  <a:pt x="8763" y="9128"/>
+                </a:lnTo>
+                <a:lnTo>
+                  <a:pt x="8763" y="0"/>
+                </a:lnTo>
+                <a:close/>
+              </a:path>
+            </a:pathLst>
+          </a:custGeom>
+          <a:solidFill>
+            <a:schemeClr val="tx2"/>
+          </a:solidFill>
+          <a:ln w="0">
+            <a:noFill/>
+            <a:prstDash val="solid"/>
+            <a:round/>
+            <a:headEnd/>
+            <a:tailEnd/>
+          </a:ln>
+        </p:spPr>
         <p:txBody>
           <a:bodyPr/>
           <a:lstStyle/>
           <a:p>
-            <a:pPr marL="0" indent="0">
-              <a:buNone/>
-            </a:pPr>
-            <a:r>
-              <a:rPr lang="en-US" dirty="0" err="1">
-                <a:hlinkClick r:id="rId2"/>
-              </a:rPr>
-              <a:t>Scholarsphere_project_Link</a:t>
-            </a:r>
-            <a:endParaRPr lang="en-US" dirty="0"/>
-          </a:p>
-        </p:txBody>
-      </p:sp>
+            <a:endParaRPr lang="en-US"/>
+          </a:p>
+        </p:txBody>
+      </p:sp>
+      <p:sp>
+        <p:nvSpPr>
+          <p:cNvPr id="49" name="Freeform 6">
+            <a:extLst>
+              <a:ext uri="{FF2B5EF4-FFF2-40B4-BE49-F238E27FC236}">
+                <a16:creationId xmlns:a16="http://schemas.microsoft.com/office/drawing/2014/main" id="{A9D08DBA-0326-4C4E-ACFB-576F3ABDD2D0}"/>
+              </a:ext>
+              <a:ext uri="{C183D7F6-B498-43B3-948B-1728B52AA6E4}">
+                <adec:decorative xmlns:adec="http://schemas.microsoft.com/office/drawing/2017/decorative" val="1"/>
+              </a:ext>
+            </a:extLst>
+          </p:cNvPr>
+          <p:cNvSpPr>
+            <a:spLocks noGrp="1" noRot="1" noChangeAspect="1" noMove="1" noResize="1" noEditPoints="1" noAdjustHandles="1" noChangeArrowheads="1" noChangeShapeType="1" noTextEdit="1"/>
+          </p:cNvSpPr>
+          <p:nvPr>
+            <p:extLst>
+              <p:ext uri="{386F3935-93C4-4BCD-93E2-E3B085C9AB24}">
+                <p16:designElem xmlns:p16="http://schemas.microsoft.com/office/powerpoint/2015/main" val="1"/>
+              </p:ext>
+            </p:extLst>
+          </p:nvPr>
+        </p:nvSpPr>
+        <p:spPr bwMode="auto">
+          <a:xfrm>
+            <a:off x="4494670" y="2016617"/>
+            <a:ext cx="3275013" cy="4408488"/>
+          </a:xfrm>
+          <a:custGeom>
+            <a:avLst/>
+            <a:gdLst/>
+            <a:ahLst/>
+            <a:cxnLst/>
+            <a:rect l="l" t="t" r="r" b="b"/>
+            <a:pathLst>
+              <a:path w="10000" h="10000">
+                <a:moveTo>
+                  <a:pt x="8761" y="0"/>
+                </a:moveTo>
+                <a:lnTo>
+                  <a:pt x="10000" y="0"/>
+                </a:lnTo>
+                <a:lnTo>
+                  <a:pt x="10000" y="10000"/>
+                </a:lnTo>
+                <a:lnTo>
+                  <a:pt x="0" y="10000"/>
+                </a:lnTo>
+                <a:lnTo>
+                  <a:pt x="0" y="9126"/>
+                </a:lnTo>
+                <a:lnTo>
+                  <a:pt x="8761" y="9127"/>
+                </a:lnTo>
+                <a:lnTo>
+                  <a:pt x="8761" y="0"/>
+                </a:lnTo>
+                <a:close/>
+              </a:path>
+            </a:pathLst>
+          </a:custGeom>
+          <a:solidFill>
+            <a:schemeClr val="tx2"/>
+          </a:solidFill>
+          <a:ln w="0">
+            <a:noFill/>
+            <a:prstDash val="solid"/>
+            <a:round/>
+            <a:headEnd/>
+            <a:tailEnd/>
+          </a:ln>
+        </p:spPr>
+        <p:txBody>
+          <a:bodyPr/>
+          <a:lstStyle/>
+          <a:p>
+            <a:endParaRPr lang="en-US"/>
+          </a:p>
+        </p:txBody>
+      </p:sp>
+      <p:pic>
+        <p:nvPicPr>
+          <p:cNvPr id="7" name="Content Placeholder 6">
+            <a:extLst>
+              <a:ext uri="{FF2B5EF4-FFF2-40B4-BE49-F238E27FC236}">
+                <a16:creationId xmlns:a16="http://schemas.microsoft.com/office/drawing/2014/main" id="{FDDEA2A5-B38A-5388-AE2C-3DD59F1D6BFB}"/>
+              </a:ext>
+            </a:extLst>
+          </p:cNvPr>
+          <p:cNvPicPr>
+            <a:picLocks noGrp="1" noChangeAspect="1"/>
+          </p:cNvPicPr>
+          <p:nvPr>
+            <p:ph idx="1"/>
+          </p:nvPr>
+        </p:nvPicPr>
+        <p:blipFill>
+          <a:blip r:embed="rId2"/>
+          <a:stretch>
+            <a:fillRect/>
+          </a:stretch>
+        </p:blipFill>
+        <p:spPr>
+          <a:xfrm>
+            <a:off x="1379023" y="1866200"/>
+            <a:ext cx="5659222" cy="3324792"/>
+          </a:xfrm>
+          <a:prstGeom prst="rect">
+            <a:avLst/>
+          </a:prstGeom>
+        </p:spPr>
+      </p:pic>
     </p:spTree>
     <p:extLst>
       <p:ext uri="{BB962C8B-B14F-4D97-AF65-F5344CB8AC3E}">
-        <p14:creationId xmlns:p14="http://schemas.microsoft.com/office/powerpoint/2010/main" val="3190260583"/>
+        <p14:creationId xmlns:p14="http://schemas.microsoft.com/office/powerpoint/2010/main" val="2633594074"/>
       </p:ext>
     </p:extLst>
   </p:cSld>
@@ -4710,6 +5454,14 @@
 <file path=ppt/slides/slide5.xml><?xml version="1.0" encoding="utf-8"?>
 <p:sld xmlns:a="http://schemas.openxmlformats.org/drawingml/2006/main" xmlns:r="http://schemas.openxmlformats.org/officeDocument/2006/relationships" xmlns:p="http://schemas.openxmlformats.org/presentationml/2006/main">
   <p:cSld>
+    <p:bg>
+      <p:bgPr>
+        <a:solidFill>
+          <a:schemeClr val="bg2"/>
+        </a:solidFill>
+        <a:effectLst/>
+      </p:bgPr>
+    </p:bg>
     <p:spTree>
       <p:nvGrpSpPr>
         <p:cNvPr id="1" name=""/>
@@ -4724,6 +5476,367 @@
           <a:chExt cx="0" cy="0"/>
         </a:xfrm>
       </p:grpSpPr>
+      <p:grpSp>
+        <p:nvGrpSpPr>
+          <p:cNvPr id="10" name="Group 9">
+            <a:extLst>
+              <a:ext uri="{FF2B5EF4-FFF2-40B4-BE49-F238E27FC236}">
+                <a16:creationId xmlns:a16="http://schemas.microsoft.com/office/drawing/2014/main" id="{9D9D6BF1-DFF2-4526-9D13-BF339D8C4163}"/>
+              </a:ext>
+              <a:ext uri="{C183D7F6-B498-43B3-948B-1728B52AA6E4}">
+                <adec:decorative xmlns:adec="http://schemas.microsoft.com/office/drawing/2017/decorative" val="1"/>
+              </a:ext>
+            </a:extLst>
+          </p:cNvPr>
+          <p:cNvGrpSpPr>
+            <a:grpSpLocks noGrp="1" noUngrp="1" noRot="1" noChangeAspect="1" noMove="1" noResize="1"/>
+          </p:cNvGrpSpPr>
+          <p:nvPr>
+            <p:extLst>
+              <p:ext uri="{386F3935-93C4-4BCD-93E2-E3B085C9AB24}">
+                <p16:designElem xmlns:p16="http://schemas.microsoft.com/office/powerpoint/2015/main" val="1"/>
+              </p:ext>
+            </p:extLst>
+          </p:nvPr>
+        </p:nvGrpSpPr>
+        <p:grpSpPr>
+          <a:xfrm>
+            <a:off x="752858" y="744469"/>
+            <a:ext cx="10674117" cy="5349671"/>
+            <a:chOff x="752858" y="744469"/>
+            <a:chExt cx="10674117" cy="5349671"/>
+          </a:xfrm>
+        </p:grpSpPr>
+        <p:sp>
+          <p:nvSpPr>
+            <p:cNvPr id="11" name="Freeform 6">
+              <a:extLst>
+                <a:ext uri="{FF2B5EF4-FFF2-40B4-BE49-F238E27FC236}">
+                  <a16:creationId xmlns:a16="http://schemas.microsoft.com/office/drawing/2014/main" id="{A54D4DB6-FB18-4CAE-8905-E0053C92569E}"/>
+                </a:ext>
+                <a:ext uri="{C183D7F6-B498-43B3-948B-1728B52AA6E4}">
+                  <adec:decorative xmlns:adec="http://schemas.microsoft.com/office/drawing/2017/decorative" val="1"/>
+                </a:ext>
+              </a:extLst>
+            </p:cNvPr>
+            <p:cNvSpPr/>
+            <p:nvPr>
+              <p:extLst>
+                <p:ext uri="{386F3935-93C4-4BCD-93E2-E3B085C9AB24}">
+                  <p16:designElem xmlns:p16="http://schemas.microsoft.com/office/powerpoint/2015/main" val="1"/>
+                </p:ext>
+              </p:extLst>
+            </p:nvPr>
+          </p:nvSpPr>
+          <p:spPr bwMode="auto">
+            <a:xfrm>
+              <a:off x="8151962" y="1685652"/>
+              <a:ext cx="3275013" cy="4408488"/>
+            </a:xfrm>
+            <a:custGeom>
+              <a:avLst/>
+              <a:gdLst/>
+              <a:ahLst/>
+              <a:cxnLst/>
+              <a:rect l="l" t="t" r="r" b="b"/>
+              <a:pathLst>
+                <a:path w="10000" h="10000">
+                  <a:moveTo>
+                    <a:pt x="8761" y="0"/>
+                  </a:moveTo>
+                  <a:lnTo>
+                    <a:pt x="10000" y="0"/>
+                  </a:lnTo>
+                  <a:lnTo>
+                    <a:pt x="10000" y="10000"/>
+                  </a:lnTo>
+                  <a:lnTo>
+                    <a:pt x="0" y="10000"/>
+                  </a:lnTo>
+                  <a:lnTo>
+                    <a:pt x="0" y="9126"/>
+                  </a:lnTo>
+                  <a:lnTo>
+                    <a:pt x="8761" y="9127"/>
+                  </a:lnTo>
+                  <a:lnTo>
+                    <a:pt x="8761" y="0"/>
+                  </a:lnTo>
+                  <a:close/>
+                </a:path>
+              </a:pathLst>
+            </a:custGeom>
+            <a:solidFill>
+              <a:schemeClr val="tx2"/>
+            </a:solidFill>
+            <a:ln w="0">
+              <a:noFill/>
+              <a:prstDash val="solid"/>
+              <a:round/>
+              <a:headEnd/>
+              <a:tailEnd/>
+            </a:ln>
+          </p:spPr>
+          <p:txBody>
+            <a:bodyPr/>
+            <a:lstStyle/>
+            <a:p>
+              <a:endParaRPr lang="en-US"/>
+            </a:p>
+          </p:txBody>
+        </p:sp>
+        <p:sp>
+          <p:nvSpPr>
+            <p:cNvPr id="12" name="Freeform 6">
+              <a:extLst>
+                <a:ext uri="{FF2B5EF4-FFF2-40B4-BE49-F238E27FC236}">
+                  <a16:creationId xmlns:a16="http://schemas.microsoft.com/office/drawing/2014/main" id="{1DBD6488-9429-4FFA-8AE8-C4022C39B0F2}"/>
+                </a:ext>
+                <a:ext uri="{C183D7F6-B498-43B3-948B-1728B52AA6E4}">
+                  <adec:decorative xmlns:adec="http://schemas.microsoft.com/office/drawing/2017/decorative" val="1"/>
+                </a:ext>
+              </a:extLst>
+            </p:cNvPr>
+            <p:cNvSpPr/>
+            <p:nvPr>
+              <p:extLst>
+                <p:ext uri="{386F3935-93C4-4BCD-93E2-E3B085C9AB24}">
+                  <p16:designElem xmlns:p16="http://schemas.microsoft.com/office/powerpoint/2015/main" val="1"/>
+                </p:ext>
+              </p:extLst>
+            </p:nvPr>
+          </p:nvSpPr>
+          <p:spPr bwMode="auto">
+            <a:xfrm flipH="1" flipV="1">
+              <a:off x="752858" y="744469"/>
+              <a:ext cx="3275668" cy="4408488"/>
+            </a:xfrm>
+            <a:custGeom>
+              <a:avLst/>
+              <a:gdLst/>
+              <a:ahLst/>
+              <a:cxnLst/>
+              <a:rect l="l" t="t" r="r" b="b"/>
+              <a:pathLst>
+                <a:path w="10002" h="10000">
+                  <a:moveTo>
+                    <a:pt x="8763" y="0"/>
+                  </a:moveTo>
+                  <a:lnTo>
+                    <a:pt x="10002" y="0"/>
+                  </a:lnTo>
+                  <a:lnTo>
+                    <a:pt x="10002" y="10000"/>
+                  </a:lnTo>
+                  <a:lnTo>
+                    <a:pt x="2" y="10000"/>
+                  </a:lnTo>
+                  <a:cubicBezTo>
+                    <a:pt x="-2" y="9698"/>
+                    <a:pt x="4" y="9427"/>
+                    <a:pt x="0" y="9125"/>
+                  </a:cubicBezTo>
+                  <a:lnTo>
+                    <a:pt x="8763" y="9128"/>
+                  </a:lnTo>
+                  <a:lnTo>
+                    <a:pt x="8763" y="0"/>
+                  </a:lnTo>
+                  <a:close/>
+                </a:path>
+              </a:pathLst>
+            </a:custGeom>
+            <a:solidFill>
+              <a:schemeClr val="tx2"/>
+            </a:solidFill>
+            <a:ln w="0">
+              <a:noFill/>
+              <a:prstDash val="solid"/>
+              <a:round/>
+              <a:headEnd/>
+              <a:tailEnd/>
+            </a:ln>
+          </p:spPr>
+          <p:txBody>
+            <a:bodyPr/>
+            <a:lstStyle/>
+            <a:p>
+              <a:endParaRPr lang="en-US"/>
+            </a:p>
+          </p:txBody>
+        </p:sp>
+      </p:grpSp>
+      <p:sp useBgFill="1">
+        <p:nvSpPr>
+          <p:cNvPr id="14" name="Rectangle 13">
+            <a:extLst>
+              <a:ext uri="{FF2B5EF4-FFF2-40B4-BE49-F238E27FC236}">
+                <a16:creationId xmlns:a16="http://schemas.microsoft.com/office/drawing/2014/main" id="{2D170B9C-85A5-4673-981C-DDDBAC51F745}"/>
+              </a:ext>
+              <a:ext uri="{C183D7F6-B498-43B3-948B-1728B52AA6E4}">
+                <adec:decorative xmlns:adec="http://schemas.microsoft.com/office/drawing/2017/decorative" val="1"/>
+              </a:ext>
+            </a:extLst>
+          </p:cNvPr>
+          <p:cNvSpPr>
+            <a:spLocks noGrp="1" noRot="1" noChangeAspect="1" noMove="1" noResize="1" noEditPoints="1" noAdjustHandles="1" noChangeArrowheads="1" noChangeShapeType="1" noTextEdit="1"/>
+          </p:cNvSpPr>
+          <p:nvPr>
+            <p:extLst>
+              <p:ext uri="{386F3935-93C4-4BCD-93E2-E3B085C9AB24}">
+                <p16:designElem xmlns:p16="http://schemas.microsoft.com/office/powerpoint/2015/main" val="1"/>
+              </p:ext>
+            </p:extLst>
+          </p:nvPr>
+        </p:nvSpPr>
+        <p:spPr>
+          <a:xfrm>
+            <a:off x="0" y="0"/>
+            <a:ext cx="12192000" cy="6858000"/>
+          </a:xfrm>
+          <a:prstGeom prst="rect">
+            <a:avLst/>
+          </a:prstGeom>
+          <a:ln>
+            <a:noFill/>
+          </a:ln>
+        </p:spPr>
+        <p:style>
+          <a:lnRef idx="2">
+            <a:schemeClr val="accent1">
+              <a:shade val="50000"/>
+            </a:schemeClr>
+          </a:lnRef>
+          <a:fillRef idx="1">
+            <a:schemeClr val="accent1"/>
+          </a:fillRef>
+          <a:effectRef idx="0">
+            <a:schemeClr val="accent1"/>
+          </a:effectRef>
+          <a:fontRef idx="minor">
+            <a:schemeClr val="lt1"/>
+          </a:fontRef>
+        </p:style>
+        <p:txBody>
+          <a:bodyPr rtlCol="0" anchor="ctr"/>
+          <a:lstStyle/>
+          <a:p>
+            <a:pPr algn="ctr"/>
+            <a:endParaRPr lang="en-US"/>
+          </a:p>
+        </p:txBody>
+      </p:sp>
+      <p:pic>
+        <p:nvPicPr>
+          <p:cNvPr id="6" name="Picture 5" descr="White puzzle with one red piece">
+            <a:extLst>
+              <a:ext uri="{FF2B5EF4-FFF2-40B4-BE49-F238E27FC236}">
+                <a16:creationId xmlns:a16="http://schemas.microsoft.com/office/drawing/2014/main" id="{D56BFFD6-1573-272D-CE02-113968518CBB}"/>
+              </a:ext>
+            </a:extLst>
+          </p:cNvPr>
+          <p:cNvPicPr>
+            <a:picLocks noChangeAspect="1"/>
+          </p:cNvPicPr>
+          <p:nvPr/>
+        </p:nvPicPr>
+        <p:blipFill rotWithShape="1">
+          <a:blip r:embed="rId2"/>
+          <a:srcRect l="30435" r="28831"/>
+          <a:stretch/>
+        </p:blipFill>
+        <p:spPr>
+          <a:xfrm>
+            <a:off x="20" y="10"/>
+            <a:ext cx="4966232" cy="6857990"/>
+          </a:xfrm>
+          <a:prstGeom prst="rect">
+            <a:avLst/>
+          </a:prstGeom>
+        </p:spPr>
+      </p:pic>
+      <p:sp>
+        <p:nvSpPr>
+          <p:cNvPr id="16" name="Freeform 6">
+            <a:extLst>
+              <a:ext uri="{FF2B5EF4-FFF2-40B4-BE49-F238E27FC236}">
+                <a16:creationId xmlns:a16="http://schemas.microsoft.com/office/drawing/2014/main" id="{1C82216A-4221-434A-B11C-7E13B4A1FC25}"/>
+              </a:ext>
+              <a:ext uri="{C183D7F6-B498-43B3-948B-1728B52AA6E4}">
+                <adec:decorative xmlns:adec="http://schemas.microsoft.com/office/drawing/2017/decorative" val="1"/>
+              </a:ext>
+            </a:extLst>
+          </p:cNvPr>
+          <p:cNvSpPr>
+            <a:spLocks noGrp="1" noRot="1" noChangeAspect="1" noMove="1" noResize="1" noEditPoints="1" noAdjustHandles="1" noChangeArrowheads="1" noChangeShapeType="1" noTextEdit="1"/>
+          </p:cNvSpPr>
+          <p:nvPr>
+            <p:extLst>
+              <p:ext uri="{386F3935-93C4-4BCD-93E2-E3B085C9AB24}">
+                <p16:designElem xmlns:p16="http://schemas.microsoft.com/office/powerpoint/2015/main" val="1"/>
+              </p:ext>
+            </p:extLst>
+          </p:nvPr>
+        </p:nvSpPr>
+        <p:spPr bwMode="auto">
+          <a:xfrm flipH="1" flipV="1">
+            <a:off x="5412340" y="744469"/>
+            <a:ext cx="3275668" cy="4408488"/>
+          </a:xfrm>
+          <a:custGeom>
+            <a:avLst/>
+            <a:gdLst/>
+            <a:ahLst/>
+            <a:cxnLst/>
+            <a:rect l="l" t="t" r="r" b="b"/>
+            <a:pathLst>
+              <a:path w="10002" h="10000">
+                <a:moveTo>
+                  <a:pt x="8763" y="0"/>
+                </a:moveTo>
+                <a:lnTo>
+                  <a:pt x="10002" y="0"/>
+                </a:lnTo>
+                <a:lnTo>
+                  <a:pt x="10002" y="10000"/>
+                </a:lnTo>
+                <a:lnTo>
+                  <a:pt x="2" y="10000"/>
+                </a:lnTo>
+                <a:cubicBezTo>
+                  <a:pt x="-2" y="9698"/>
+                  <a:pt x="4" y="9427"/>
+                  <a:pt x="0" y="9125"/>
+                </a:cubicBezTo>
+                <a:lnTo>
+                  <a:pt x="8763" y="9128"/>
+                </a:lnTo>
+                <a:lnTo>
+                  <a:pt x="8763" y="0"/>
+                </a:lnTo>
+                <a:close/>
+              </a:path>
+            </a:pathLst>
+          </a:custGeom>
+          <a:solidFill>
+            <a:schemeClr val="tx2"/>
+          </a:solidFill>
+          <a:ln w="0">
+            <a:noFill/>
+            <a:prstDash val="solid"/>
+            <a:round/>
+            <a:headEnd/>
+            <a:tailEnd/>
+          </a:ln>
+        </p:spPr>
+        <p:txBody>
+          <a:bodyPr/>
+          <a:lstStyle/>
+          <a:p>
+            <a:endParaRPr lang="en-US"/>
+          </a:p>
+        </p:txBody>
+      </p:sp>
       <p:sp>
         <p:nvSpPr>
           <p:cNvPr id="2" name="Title 1">
@@ -4740,18 +5853,21 @@
             <p:ph type="title"/>
           </p:nvPr>
         </p:nvSpPr>
-        <p:spPr/>
-        <p:txBody>
-          <a:bodyPr/>
+        <p:spPr>
+          <a:xfrm>
+            <a:off x="6138004" y="1480930"/>
+            <a:ext cx="5607908" cy="3254321"/>
+          </a:xfrm>
+        </p:spPr>
+        <p:txBody>
+          <a:bodyPr vert="horz" lIns="91440" tIns="45720" rIns="91440" bIns="45720" rtlCol="0" anchor="b">
+            <a:normAutofit/>
+          </a:bodyPr>
           <a:lstStyle/>
           <a:p>
             <a:r>
-              <a:rPr lang="en-IN" dirty="0" err="1"/>
-              <a:t>Github</a:t>
-            </a:r>
-            <a:r>
-              <a:rPr lang="en-IN" dirty="0"/>
-              <a:t> Link For Project</a:t>
+              <a:rPr lang="en-US" sz="7000" cap="all"/>
+              <a:t>Jira Link For Project</a:t>
             </a:r>
           </a:p>
         </p:txBody>
@@ -4772,21 +5888,613 @@
             <p:ph idx="1"/>
           </p:nvPr>
         </p:nvSpPr>
-        <p:spPr/>
+        <p:spPr>
+          <a:xfrm>
+            <a:off x="6138006" y="4804850"/>
+            <a:ext cx="5607906" cy="1086237"/>
+          </a:xfrm>
+        </p:spPr>
+        <p:txBody>
+          <a:bodyPr vert="horz" lIns="91440" tIns="45720" rIns="91440" bIns="45720" rtlCol="0">
+            <a:normAutofit/>
+          </a:bodyPr>
+          <a:lstStyle/>
+          <a:p>
+            <a:pPr marL="0" indent="0">
+              <a:lnSpc>
+                <a:spcPct val="112000"/>
+              </a:lnSpc>
+              <a:spcBef>
+                <a:spcPts val="0"/>
+              </a:spcBef>
+              <a:spcAft>
+                <a:spcPts val="600"/>
+              </a:spcAft>
+              <a:buNone/>
+            </a:pPr>
+            <a:r>
+              <a:rPr lang="en-US" sz="2300">
+                <a:hlinkClick r:id="rId3"/>
+              </a:rPr>
+              <a:t>Scholarsphere_project_Link</a:t>
+            </a:r>
+            <a:endParaRPr lang="en-US" sz="2300"/>
+          </a:p>
+        </p:txBody>
+      </p:sp>
+    </p:spTree>
+    <p:extLst>
+      <p:ext uri="{BB962C8B-B14F-4D97-AF65-F5344CB8AC3E}">
+        <p14:creationId xmlns:p14="http://schemas.microsoft.com/office/powerpoint/2010/main" val="3190260583"/>
+      </p:ext>
+    </p:extLst>
+  </p:cSld>
+  <p:clrMapOvr>
+    <a:masterClrMapping/>
+  </p:clrMapOvr>
+  <p:timing>
+    <p:tnLst>
+      <p:par>
+        <p:cTn id="1" dur="indefinite" restart="never" nodeType="tmRoot">
+          <p:childTnLst>
+            <p:seq concurrent="1" nextAc="seek">
+              <p:cTn id="2" dur="indefinite" nodeType="mainSeq">
+                <p:childTnLst>
+                  <p:par>
+                    <p:cTn id="3" fill="hold">
+                      <p:stCondLst>
+                        <p:cond delay="indefinite"/>
+                        <p:cond evt="onBegin" delay="0">
+                          <p:tn val="2"/>
+                        </p:cond>
+                      </p:stCondLst>
+                      <p:childTnLst>
+                        <p:par>
+                          <p:cTn id="4" fill="hold">
+                            <p:stCondLst>
+                              <p:cond delay="0"/>
+                            </p:stCondLst>
+                            <p:childTnLst>
+                              <p:par>
+                                <p:cTn id="5" presetID="10" presetClass="entr" presetSubtype="0" fill="hold" grpId="0" nodeType="withEffect">
+                                  <p:stCondLst>
+                                    <p:cond delay="1000"/>
+                                  </p:stCondLst>
+                                  <p:iterate type="lt">
+                                    <p:tmPct val="10000"/>
+                                  </p:iterate>
+                                  <p:childTnLst>
+                                    <p:set>
+                                      <p:cBhvr>
+                                        <p:cTn id="6" dur="1" fill="hold">
+                                          <p:stCondLst>
+                                            <p:cond delay="0"/>
+                                          </p:stCondLst>
+                                        </p:cTn>
+                                        <p:tgtEl>
+                                          <p:spTgt spid="2"/>
+                                        </p:tgtEl>
+                                        <p:attrNameLst>
+                                          <p:attrName>style.visibility</p:attrName>
+                                        </p:attrNameLst>
+                                      </p:cBhvr>
+                                      <p:to>
+                                        <p:strVal val="visible"/>
+                                      </p:to>
+                                    </p:set>
+                                    <p:animEffect transition="in" filter="fade">
+                                      <p:cBhvr>
+                                        <p:cTn id="7" dur="400"/>
+                                        <p:tgtEl>
+                                          <p:spTgt spid="2"/>
+                                        </p:tgtEl>
+                                      </p:cBhvr>
+                                    </p:animEffect>
+                                  </p:childTnLst>
+                                </p:cTn>
+                              </p:par>
+                            </p:childTnLst>
+                          </p:cTn>
+                        </p:par>
+                      </p:childTnLst>
+                    </p:cTn>
+                  </p:par>
+                </p:childTnLst>
+              </p:cTn>
+              <p:prevCondLst>
+                <p:cond evt="onPrev" delay="0">
+                  <p:tgtEl>
+                    <p:sldTgt/>
+                  </p:tgtEl>
+                </p:cond>
+              </p:prevCondLst>
+              <p:nextCondLst>
+                <p:cond evt="onNext" delay="0">
+                  <p:tgtEl>
+                    <p:sldTgt/>
+                  </p:tgtEl>
+                </p:cond>
+              </p:nextCondLst>
+            </p:seq>
+          </p:childTnLst>
+        </p:cTn>
+      </p:par>
+    </p:tnLst>
+    <p:bldLst>
+      <p:bldP spid="2" grpId="0"/>
+    </p:bldLst>
+  </p:timing>
+</p:sld>
+</file>
+
+<file path=ppt/slides/slide6.xml><?xml version="1.0" encoding="utf-8"?>
+<p:sld xmlns:a="http://schemas.openxmlformats.org/drawingml/2006/main" xmlns:r="http://schemas.openxmlformats.org/officeDocument/2006/relationships" xmlns:p="http://schemas.openxmlformats.org/presentationml/2006/main">
+  <p:cSld>
+    <p:bg>
+      <p:bgPr>
+        <a:solidFill>
+          <a:schemeClr val="bg2"/>
+        </a:solidFill>
+        <a:effectLst/>
+      </p:bgPr>
+    </p:bg>
+    <p:spTree>
+      <p:nvGrpSpPr>
+        <p:cNvPr id="1" name=""/>
+        <p:cNvGrpSpPr/>
+        <p:nvPr/>
+      </p:nvGrpSpPr>
+      <p:grpSpPr>
+        <a:xfrm>
+          <a:off x="0" y="0"/>
+          <a:ext cx="0" cy="0"/>
+          <a:chOff x="0" y="0"/>
+          <a:chExt cx="0" cy="0"/>
+        </a:xfrm>
+      </p:grpSpPr>
+      <p:grpSp>
+        <p:nvGrpSpPr>
+          <p:cNvPr id="20" name="Group 19">
+            <a:extLst>
+              <a:ext uri="{FF2B5EF4-FFF2-40B4-BE49-F238E27FC236}">
+                <a16:creationId xmlns:a16="http://schemas.microsoft.com/office/drawing/2014/main" id="{9D9D6BF1-DFF2-4526-9D13-BF339D8C4163}"/>
+              </a:ext>
+              <a:ext uri="{C183D7F6-B498-43B3-948B-1728B52AA6E4}">
+                <adec:decorative xmlns:adec="http://schemas.microsoft.com/office/drawing/2017/decorative" val="1"/>
+              </a:ext>
+            </a:extLst>
+          </p:cNvPr>
+          <p:cNvGrpSpPr>
+            <a:grpSpLocks noGrp="1" noUngrp="1" noRot="1" noChangeAspect="1" noMove="1" noResize="1"/>
+          </p:cNvGrpSpPr>
+          <p:nvPr>
+            <p:extLst>
+              <p:ext uri="{386F3935-93C4-4BCD-93E2-E3B085C9AB24}">
+                <p16:designElem xmlns:p16="http://schemas.microsoft.com/office/powerpoint/2015/main" val="1"/>
+              </p:ext>
+            </p:extLst>
+          </p:nvPr>
+        </p:nvGrpSpPr>
+        <p:grpSpPr>
+          <a:xfrm>
+            <a:off x="752858" y="744469"/>
+            <a:ext cx="10674117" cy="5349671"/>
+            <a:chOff x="752858" y="744469"/>
+            <a:chExt cx="10674117" cy="5349671"/>
+          </a:xfrm>
+        </p:grpSpPr>
+        <p:sp>
+          <p:nvSpPr>
+            <p:cNvPr id="21" name="Freeform 6">
+              <a:extLst>
+                <a:ext uri="{FF2B5EF4-FFF2-40B4-BE49-F238E27FC236}">
+                  <a16:creationId xmlns:a16="http://schemas.microsoft.com/office/drawing/2014/main" id="{A54D4DB6-FB18-4CAE-8905-E0053C92569E}"/>
+                </a:ext>
+                <a:ext uri="{C183D7F6-B498-43B3-948B-1728B52AA6E4}">
+                  <adec:decorative xmlns:adec="http://schemas.microsoft.com/office/drawing/2017/decorative" val="1"/>
+                </a:ext>
+              </a:extLst>
+            </p:cNvPr>
+            <p:cNvSpPr/>
+            <p:nvPr>
+              <p:extLst>
+                <p:ext uri="{386F3935-93C4-4BCD-93E2-E3B085C9AB24}">
+                  <p16:designElem xmlns:p16="http://schemas.microsoft.com/office/powerpoint/2015/main" val="1"/>
+                </p:ext>
+              </p:extLst>
+            </p:nvPr>
+          </p:nvSpPr>
+          <p:spPr bwMode="auto">
+            <a:xfrm>
+              <a:off x="8151962" y="1685652"/>
+              <a:ext cx="3275013" cy="4408488"/>
+            </a:xfrm>
+            <a:custGeom>
+              <a:avLst/>
+              <a:gdLst/>
+              <a:ahLst/>
+              <a:cxnLst/>
+              <a:rect l="l" t="t" r="r" b="b"/>
+              <a:pathLst>
+                <a:path w="10000" h="10000">
+                  <a:moveTo>
+                    <a:pt x="8761" y="0"/>
+                  </a:moveTo>
+                  <a:lnTo>
+                    <a:pt x="10000" y="0"/>
+                  </a:lnTo>
+                  <a:lnTo>
+                    <a:pt x="10000" y="10000"/>
+                  </a:lnTo>
+                  <a:lnTo>
+                    <a:pt x="0" y="10000"/>
+                  </a:lnTo>
+                  <a:lnTo>
+                    <a:pt x="0" y="9126"/>
+                  </a:lnTo>
+                  <a:lnTo>
+                    <a:pt x="8761" y="9127"/>
+                  </a:lnTo>
+                  <a:lnTo>
+                    <a:pt x="8761" y="0"/>
+                  </a:lnTo>
+                  <a:close/>
+                </a:path>
+              </a:pathLst>
+            </a:custGeom>
+            <a:solidFill>
+              <a:schemeClr val="tx2"/>
+            </a:solidFill>
+            <a:ln w="0">
+              <a:noFill/>
+              <a:prstDash val="solid"/>
+              <a:round/>
+              <a:headEnd/>
+              <a:tailEnd/>
+            </a:ln>
+          </p:spPr>
+          <p:txBody>
+            <a:bodyPr/>
+            <a:lstStyle/>
+            <a:p>
+              <a:endParaRPr lang="en-US"/>
+            </a:p>
+          </p:txBody>
+        </p:sp>
+        <p:sp>
+          <p:nvSpPr>
+            <p:cNvPr id="22" name="Freeform 6">
+              <a:extLst>
+                <a:ext uri="{FF2B5EF4-FFF2-40B4-BE49-F238E27FC236}">
+                  <a16:creationId xmlns:a16="http://schemas.microsoft.com/office/drawing/2014/main" id="{1DBD6488-9429-4FFA-8AE8-C4022C39B0F2}"/>
+                </a:ext>
+                <a:ext uri="{C183D7F6-B498-43B3-948B-1728B52AA6E4}">
+                  <adec:decorative xmlns:adec="http://schemas.microsoft.com/office/drawing/2017/decorative" val="1"/>
+                </a:ext>
+              </a:extLst>
+            </p:cNvPr>
+            <p:cNvSpPr/>
+            <p:nvPr>
+              <p:extLst>
+                <p:ext uri="{386F3935-93C4-4BCD-93E2-E3B085C9AB24}">
+                  <p16:designElem xmlns:p16="http://schemas.microsoft.com/office/powerpoint/2015/main" val="1"/>
+                </p:ext>
+              </p:extLst>
+            </p:nvPr>
+          </p:nvSpPr>
+          <p:spPr bwMode="auto">
+            <a:xfrm flipH="1" flipV="1">
+              <a:off x="752858" y="744469"/>
+              <a:ext cx="3275668" cy="4408488"/>
+            </a:xfrm>
+            <a:custGeom>
+              <a:avLst/>
+              <a:gdLst/>
+              <a:ahLst/>
+              <a:cxnLst/>
+              <a:rect l="l" t="t" r="r" b="b"/>
+              <a:pathLst>
+                <a:path w="10002" h="10000">
+                  <a:moveTo>
+                    <a:pt x="8763" y="0"/>
+                  </a:moveTo>
+                  <a:lnTo>
+                    <a:pt x="10002" y="0"/>
+                  </a:lnTo>
+                  <a:lnTo>
+                    <a:pt x="10002" y="10000"/>
+                  </a:lnTo>
+                  <a:lnTo>
+                    <a:pt x="2" y="10000"/>
+                  </a:lnTo>
+                  <a:cubicBezTo>
+                    <a:pt x="-2" y="9698"/>
+                    <a:pt x="4" y="9427"/>
+                    <a:pt x="0" y="9125"/>
+                  </a:cubicBezTo>
+                  <a:lnTo>
+                    <a:pt x="8763" y="9128"/>
+                  </a:lnTo>
+                  <a:lnTo>
+                    <a:pt x="8763" y="0"/>
+                  </a:lnTo>
+                  <a:close/>
+                </a:path>
+              </a:pathLst>
+            </a:custGeom>
+            <a:solidFill>
+              <a:schemeClr val="tx2"/>
+            </a:solidFill>
+            <a:ln w="0">
+              <a:noFill/>
+              <a:prstDash val="solid"/>
+              <a:round/>
+              <a:headEnd/>
+              <a:tailEnd/>
+            </a:ln>
+          </p:spPr>
+          <p:txBody>
+            <a:bodyPr/>
+            <a:lstStyle/>
+            <a:p>
+              <a:endParaRPr lang="en-US"/>
+            </a:p>
+          </p:txBody>
+        </p:sp>
+      </p:grpSp>
+      <p:sp useBgFill="1">
+        <p:nvSpPr>
+          <p:cNvPr id="23" name="Rectangle 22">
+            <a:extLst>
+              <a:ext uri="{FF2B5EF4-FFF2-40B4-BE49-F238E27FC236}">
+                <a16:creationId xmlns:a16="http://schemas.microsoft.com/office/drawing/2014/main" id="{2D170B9C-85A5-4673-981C-DDDBAC51F745}"/>
+              </a:ext>
+              <a:ext uri="{C183D7F6-B498-43B3-948B-1728B52AA6E4}">
+                <adec:decorative xmlns:adec="http://schemas.microsoft.com/office/drawing/2017/decorative" val="1"/>
+              </a:ext>
+            </a:extLst>
+          </p:cNvPr>
+          <p:cNvSpPr>
+            <a:spLocks noGrp="1" noRot="1" noChangeAspect="1" noMove="1" noResize="1" noEditPoints="1" noAdjustHandles="1" noChangeArrowheads="1" noChangeShapeType="1" noTextEdit="1"/>
+          </p:cNvSpPr>
+          <p:nvPr>
+            <p:extLst>
+              <p:ext uri="{386F3935-93C4-4BCD-93E2-E3B085C9AB24}">
+                <p16:designElem xmlns:p16="http://schemas.microsoft.com/office/powerpoint/2015/main" val="1"/>
+              </p:ext>
+            </p:extLst>
+          </p:nvPr>
+        </p:nvSpPr>
+        <p:spPr>
+          <a:xfrm>
+            <a:off x="0" y="0"/>
+            <a:ext cx="12192000" cy="6858000"/>
+          </a:xfrm>
+          <a:prstGeom prst="rect">
+            <a:avLst/>
+          </a:prstGeom>
+          <a:ln>
+            <a:noFill/>
+          </a:ln>
+        </p:spPr>
+        <p:style>
+          <a:lnRef idx="2">
+            <a:schemeClr val="accent1">
+              <a:shade val="50000"/>
+            </a:schemeClr>
+          </a:lnRef>
+          <a:fillRef idx="1">
+            <a:schemeClr val="accent1"/>
+          </a:fillRef>
+          <a:effectRef idx="0">
+            <a:schemeClr val="accent1"/>
+          </a:effectRef>
+          <a:fontRef idx="minor">
+            <a:schemeClr val="lt1"/>
+          </a:fontRef>
+        </p:style>
+        <p:txBody>
+          <a:bodyPr rtlCol="0" anchor="ctr"/>
+          <a:lstStyle/>
+          <a:p>
+            <a:pPr algn="ctr"/>
+            <a:endParaRPr lang="en-US"/>
+          </a:p>
+        </p:txBody>
+      </p:sp>
+      <p:pic>
+        <p:nvPicPr>
+          <p:cNvPr id="24" name="Picture 23" descr="Blue and orange Colour Powder background">
+            <a:extLst>
+              <a:ext uri="{FF2B5EF4-FFF2-40B4-BE49-F238E27FC236}">
+                <a16:creationId xmlns:a16="http://schemas.microsoft.com/office/drawing/2014/main" id="{005D92E3-4983-B1DC-F4E6-FEA642783E33}"/>
+              </a:ext>
+            </a:extLst>
+          </p:cNvPr>
+          <p:cNvPicPr>
+            <a:picLocks noChangeAspect="1"/>
+          </p:cNvPicPr>
+          <p:nvPr/>
+        </p:nvPicPr>
+        <p:blipFill rotWithShape="1">
+          <a:blip r:embed="rId2"/>
+          <a:srcRect l="8226" r="43436" b="-1"/>
+          <a:stretch/>
+        </p:blipFill>
+        <p:spPr>
+          <a:xfrm>
+            <a:off x="20" y="10"/>
+            <a:ext cx="4966232" cy="6857990"/>
+          </a:xfrm>
+          <a:prstGeom prst="rect">
+            <a:avLst/>
+          </a:prstGeom>
+        </p:spPr>
+      </p:pic>
+      <p:sp>
+        <p:nvSpPr>
+          <p:cNvPr id="25" name="Freeform 6">
+            <a:extLst>
+              <a:ext uri="{FF2B5EF4-FFF2-40B4-BE49-F238E27FC236}">
+                <a16:creationId xmlns:a16="http://schemas.microsoft.com/office/drawing/2014/main" id="{1C82216A-4221-434A-B11C-7E13B4A1FC25}"/>
+              </a:ext>
+              <a:ext uri="{C183D7F6-B498-43B3-948B-1728B52AA6E4}">
+                <adec:decorative xmlns:adec="http://schemas.microsoft.com/office/drawing/2017/decorative" val="1"/>
+              </a:ext>
+            </a:extLst>
+          </p:cNvPr>
+          <p:cNvSpPr>
+            <a:spLocks noGrp="1" noRot="1" noChangeAspect="1" noMove="1" noResize="1" noEditPoints="1" noAdjustHandles="1" noChangeArrowheads="1" noChangeShapeType="1" noTextEdit="1"/>
+          </p:cNvSpPr>
+          <p:nvPr>
+            <p:extLst>
+              <p:ext uri="{386F3935-93C4-4BCD-93E2-E3B085C9AB24}">
+                <p16:designElem xmlns:p16="http://schemas.microsoft.com/office/powerpoint/2015/main" val="1"/>
+              </p:ext>
+            </p:extLst>
+          </p:nvPr>
+        </p:nvSpPr>
+        <p:spPr bwMode="auto">
+          <a:xfrm flipH="1" flipV="1">
+            <a:off x="5412340" y="744469"/>
+            <a:ext cx="3275668" cy="4408488"/>
+          </a:xfrm>
+          <a:custGeom>
+            <a:avLst/>
+            <a:gdLst/>
+            <a:ahLst/>
+            <a:cxnLst/>
+            <a:rect l="l" t="t" r="r" b="b"/>
+            <a:pathLst>
+              <a:path w="10002" h="10000">
+                <a:moveTo>
+                  <a:pt x="8763" y="0"/>
+                </a:moveTo>
+                <a:lnTo>
+                  <a:pt x="10002" y="0"/>
+                </a:lnTo>
+                <a:lnTo>
+                  <a:pt x="10002" y="10000"/>
+                </a:lnTo>
+                <a:lnTo>
+                  <a:pt x="2" y="10000"/>
+                </a:lnTo>
+                <a:cubicBezTo>
+                  <a:pt x="-2" y="9698"/>
+                  <a:pt x="4" y="9427"/>
+                  <a:pt x="0" y="9125"/>
+                </a:cubicBezTo>
+                <a:lnTo>
+                  <a:pt x="8763" y="9128"/>
+                </a:lnTo>
+                <a:lnTo>
+                  <a:pt x="8763" y="0"/>
+                </a:lnTo>
+                <a:close/>
+              </a:path>
+            </a:pathLst>
+          </a:custGeom>
+          <a:solidFill>
+            <a:schemeClr val="tx2"/>
+          </a:solidFill>
+          <a:ln w="0">
+            <a:noFill/>
+            <a:prstDash val="solid"/>
+            <a:round/>
+            <a:headEnd/>
+            <a:tailEnd/>
+          </a:ln>
+        </p:spPr>
         <p:txBody>
           <a:bodyPr/>
           <a:lstStyle/>
           <a:p>
+            <a:endParaRPr lang="en-US"/>
+          </a:p>
+        </p:txBody>
+      </p:sp>
+      <p:sp>
+        <p:nvSpPr>
+          <p:cNvPr id="2" name="Title 1">
+            <a:extLst>
+              <a:ext uri="{FF2B5EF4-FFF2-40B4-BE49-F238E27FC236}">
+                <a16:creationId xmlns:a16="http://schemas.microsoft.com/office/drawing/2014/main" id="{2BFB4512-644D-2E46-94FC-8C3AA76B1BA2}"/>
+              </a:ext>
+            </a:extLst>
+          </p:cNvPr>
+          <p:cNvSpPr>
+            <a:spLocks noGrp="1"/>
+          </p:cNvSpPr>
+          <p:nvPr>
+            <p:ph type="title"/>
+          </p:nvPr>
+        </p:nvSpPr>
+        <p:spPr>
+          <a:xfrm>
+            <a:off x="6138004" y="1480930"/>
+            <a:ext cx="5607908" cy="3254321"/>
+          </a:xfrm>
+        </p:spPr>
+        <p:txBody>
+          <a:bodyPr vert="horz" lIns="91440" tIns="45720" rIns="91440" bIns="45720" rtlCol="0" anchor="b">
+            <a:normAutofit/>
+          </a:bodyPr>
+          <a:lstStyle/>
+          <a:p>
+            <a:r>
+              <a:rPr lang="en-US" sz="7000" cap="all"/>
+              <a:t>Github Link For Project</a:t>
+            </a:r>
+          </a:p>
+        </p:txBody>
+      </p:sp>
+      <p:sp>
+        <p:nvSpPr>
+          <p:cNvPr id="4" name="Content Placeholder 3">
+            <a:extLst>
+              <a:ext uri="{FF2B5EF4-FFF2-40B4-BE49-F238E27FC236}">
+                <a16:creationId xmlns:a16="http://schemas.microsoft.com/office/drawing/2014/main" id="{7AB87132-670F-E38B-84D8-85C4CDB9DD6E}"/>
+              </a:ext>
+            </a:extLst>
+          </p:cNvPr>
+          <p:cNvSpPr>
+            <a:spLocks noGrp="1"/>
+          </p:cNvSpPr>
+          <p:nvPr>
+            <p:ph idx="1"/>
+          </p:nvPr>
+        </p:nvSpPr>
+        <p:spPr>
+          <a:xfrm>
+            <a:off x="6138006" y="4804850"/>
+            <a:ext cx="5607906" cy="1086237"/>
+          </a:xfrm>
+        </p:spPr>
+        <p:txBody>
+          <a:bodyPr vert="horz" lIns="91440" tIns="45720" rIns="91440" bIns="45720" rtlCol="0">
+            <a:normAutofit/>
+          </a:bodyPr>
+          <a:lstStyle/>
+          <a:p>
             <a:pPr marL="0" indent="0">
+              <a:lnSpc>
+                <a:spcPct val="112000"/>
+              </a:lnSpc>
+              <a:spcBef>
+                <a:spcPts val="0"/>
+              </a:spcBef>
+              <a:spcAft>
+                <a:spcPts val="600"/>
+              </a:spcAft>
               <a:buNone/>
             </a:pPr>
             <a:r>
-              <a:rPr lang="en-US" dirty="0">
-                <a:hlinkClick r:id="rId2"/>
+              <a:rPr lang="en-US" sz="2300">
+                <a:hlinkClick r:id="rId3"/>
               </a:rPr>
               <a:t>https://github.com/LakshminathAlamuru/Project_OOD_Group20</a:t>
             </a:r>
-            <a:endParaRPr lang="en-US" dirty="0"/>
+            <a:endParaRPr lang="en-US" sz="2300"/>
           </a:p>
         </p:txBody>
       </p:sp>
@@ -4800,6 +6508,98 @@
   <p:clrMapOvr>
     <a:masterClrMapping/>
   </p:clrMapOvr>
+  <p:timing>
+    <p:tnLst>
+      <p:par>
+        <p:cTn id="1" dur="indefinite" restart="never" nodeType="tmRoot">
+          <p:childTnLst>
+            <p:seq concurrent="1" nextAc="seek">
+              <p:cTn id="2" dur="indefinite" nodeType="mainSeq">
+                <p:childTnLst>
+                  <p:par>
+                    <p:cTn id="3" fill="hold">
+                      <p:stCondLst>
+                        <p:cond delay="indefinite"/>
+                        <p:cond evt="onBegin" delay="0">
+                          <p:tn val="2"/>
+                        </p:cond>
+                      </p:stCondLst>
+                      <p:childTnLst>
+                        <p:par>
+                          <p:cTn id="4" fill="hold">
+                            <p:stCondLst>
+                              <p:cond delay="0"/>
+                            </p:stCondLst>
+                            <p:childTnLst>
+                              <p:par>
+                                <p:cTn id="5" presetID="10" presetClass="entr" presetSubtype="0" fill="hold" grpId="0" nodeType="withEffect">
+                                  <p:stCondLst>
+                                    <p:cond delay="1000"/>
+                                  </p:stCondLst>
+                                  <p:iterate>
+                                    <p:tmPct val="10000"/>
+                                  </p:iterate>
+                                  <p:childTnLst>
+                                    <p:set>
+                                      <p:cBhvr>
+                                        <p:cTn id="6" dur="1" fill="hold">
+                                          <p:stCondLst>
+                                            <p:cond delay="0"/>
+                                          </p:stCondLst>
+                                        </p:cTn>
+                                        <p:tgtEl>
+                                          <p:spTgt spid="2"/>
+                                        </p:tgtEl>
+                                        <p:attrNameLst>
+                                          <p:attrName>style.visibility</p:attrName>
+                                        </p:attrNameLst>
+                                      </p:cBhvr>
+                                      <p:to>
+                                        <p:strVal val="visible"/>
+                                      </p:to>
+                                    </p:set>
+                                    <p:animEffect transition="in" filter="fade">
+                                      <p:cBhvr>
+                                        <p:cTn id="7" dur="700"/>
+                                        <p:tgtEl>
+                                          <p:spTgt spid="2"/>
+                                        </p:tgtEl>
+                                      </p:cBhvr>
+                                    </p:animEffect>
+                                  </p:childTnLst>
+                                </p:cTn>
+                              </p:par>
+                            </p:childTnLst>
+                          </p:cTn>
+                        </p:par>
+                      </p:childTnLst>
+                    </p:cTn>
+                  </p:par>
+                </p:childTnLst>
+              </p:cTn>
+              <p:prevCondLst>
+                <p:cond evt="onPrev" delay="0">
+                  <p:tgtEl>
+                    <p:sldTgt/>
+                  </p:tgtEl>
+                </p:cond>
+              </p:prevCondLst>
+              <p:nextCondLst>
+                <p:cond evt="onNext" delay="0">
+                  <p:tgtEl>
+                    <p:sldTgt/>
+                  </p:tgtEl>
+                </p:cond>
+              </p:nextCondLst>
+            </p:seq>
+          </p:childTnLst>
+        </p:cTn>
+      </p:par>
+    </p:tnLst>
+    <p:bldLst>
+      <p:bldP spid="2" grpId="0"/>
+    </p:bldLst>
+  </p:timing>
 </p:sld>
 </file>
 
@@ -5062,6 +6862,21 @@
 </file>
 
 <file path=customXml/item1.xml><?xml version="1.0" encoding="utf-8"?>
+<p:properties xmlns:p="http://schemas.microsoft.com/office/2006/metadata/properties" xmlns:xsi="http://www.w3.org/2001/XMLSchema-instance" xmlns:pc="http://schemas.microsoft.com/office/infopath/2007/PartnerControls">
+  <documentManagement/>
+</p:properties>
+</file>
+
+<file path=customXml/item2.xml><?xml version="1.0" encoding="utf-8"?>
+<?mso-contentType ?>
+<FormTemplates xmlns="http://schemas.microsoft.com/sharepoint/v3/contenttype/forms">
+  <Display>DocumentLibraryForm</Display>
+  <Edit>DocumentLibraryForm</Edit>
+  <New>DocumentLibraryForm</New>
+</FormTemplates>
+</file>
+
+<file path=customXml/item3.xml><?xml version="1.0" encoding="utf-8"?>
 <ct:contentTypeSchema xmlns:ct="http://schemas.microsoft.com/office/2006/metadata/contentType" xmlns:ma="http://schemas.microsoft.com/office/2006/metadata/properties/metaAttributes" ct:_="" ma:_="" ma:contentTypeName="Document" ma:contentTypeID="0x010100269712D748FEDC46B0393222FE138F78" ma:contentTypeVersion="5" ma:contentTypeDescription="Create a new document." ma:contentTypeScope="" ma:versionID="2efddbf46e38cf63973396b1ac264440">
   <xsd:schema xmlns:xsd="http://www.w3.org/2001/XMLSchema" xmlns:xs="http://www.w3.org/2001/XMLSchema" xmlns:p="http://schemas.microsoft.com/office/2006/metadata/properties" xmlns:ns3="1df0befc-070f-4a10-a943-42500e74392a" targetNamespace="http://schemas.microsoft.com/office/2006/metadata/properties" ma:root="true" ma:fieldsID="f1905ce0a32b582b3e2d6b3e0bded0c7" ns3:_="">
     <xsd:import namespace="1df0befc-070f-4a10-a943-42500e74392a"/>
@@ -5211,22 +7026,31 @@
 </ct:contentTypeSchema>
 </file>
 
-<file path=customXml/item2.xml><?xml version="1.0" encoding="utf-8"?>
-<p:properties xmlns:p="http://schemas.microsoft.com/office/2006/metadata/properties" xmlns:xsi="http://www.w3.org/2001/XMLSchema-instance" xmlns:pc="http://schemas.microsoft.com/office/infopath/2007/PartnerControls">
-  <documentManagement/>
-</p:properties>
+<file path=customXml/itemProps1.xml><?xml version="1.0" encoding="utf-8"?>
+<ds:datastoreItem xmlns:ds="http://schemas.openxmlformats.org/officeDocument/2006/customXml" ds:itemID="{E885DB62-ACED-4733-AD8A-971EC56A2E10}">
+  <ds:schemaRefs>
+    <ds:schemaRef ds:uri="http://schemas.microsoft.com/office/2006/metadata/properties"/>
+    <ds:schemaRef ds:uri="http://www.w3.org/XML/1998/namespace"/>
+    <ds:schemaRef ds:uri="http://purl.org/dc/elements/1.1/"/>
+    <ds:schemaRef ds:uri="http://purl.org/dc/terms/"/>
+    <ds:schemaRef ds:uri="http://schemas.microsoft.com/office/2006/documentManagement/types"/>
+    <ds:schemaRef ds:uri="http://schemas.microsoft.com/office/infopath/2007/PartnerControls"/>
+    <ds:schemaRef ds:uri="http://schemas.openxmlformats.org/package/2006/metadata/core-properties"/>
+    <ds:schemaRef ds:uri="1df0befc-070f-4a10-a943-42500e74392a"/>
+    <ds:schemaRef ds:uri="http://purl.org/dc/dcmitype/"/>
+  </ds:schemaRefs>
+</ds:datastoreItem>
 </file>
 
-<file path=customXml/item3.xml><?xml version="1.0" encoding="utf-8"?>
-<?mso-contentType ?>
-<FormTemplates xmlns="http://schemas.microsoft.com/sharepoint/v3/contenttype/forms">
-  <Display>DocumentLibraryForm</Display>
-  <Edit>DocumentLibraryForm</Edit>
-  <New>DocumentLibraryForm</New>
-</FormTemplates>
+<file path=customXml/itemProps2.xml><?xml version="1.0" encoding="utf-8"?>
+<ds:datastoreItem xmlns:ds="http://schemas.openxmlformats.org/officeDocument/2006/customXml" ds:itemID="{419EA632-356F-46CA-A403-CA6A6CF0F6C1}">
+  <ds:schemaRefs>
+    <ds:schemaRef ds:uri="http://schemas.microsoft.com/sharepoint/v3/contenttype/forms"/>
+  </ds:schemaRefs>
+</ds:datastoreItem>
 </file>
 
-<file path=customXml/itemProps1.xml><?xml version="1.0" encoding="utf-8"?>
+<file path=customXml/itemProps3.xml><?xml version="1.0" encoding="utf-8"?>
 <ds:datastoreItem xmlns:ds="http://schemas.openxmlformats.org/officeDocument/2006/customXml" ds:itemID="{B4A8025D-48FB-4872-9BB5-E196B1B742A2}">
   <ds:schemaRefs>
     <ds:schemaRef ds:uri="1df0befc-070f-4a10-a943-42500e74392a"/>
@@ -5243,28 +7067,4 @@
     <ds:schemaRef ds:uri="http://www.w3.org/2001/XMLSchema"/>
   </ds:schemaRefs>
 </ds:datastoreItem>
-</file>
-
-<file path=customXml/itemProps2.xml><?xml version="1.0" encoding="utf-8"?>
-<ds:datastoreItem xmlns:ds="http://schemas.openxmlformats.org/officeDocument/2006/customXml" ds:itemID="{E885DB62-ACED-4733-AD8A-971EC56A2E10}">
-  <ds:schemaRefs>
-    <ds:schemaRef ds:uri="http://schemas.microsoft.com/office/2006/metadata/properties"/>
-    <ds:schemaRef ds:uri="http://www.w3.org/XML/1998/namespace"/>
-    <ds:schemaRef ds:uri="http://purl.org/dc/elements/1.1/"/>
-    <ds:schemaRef ds:uri="http://purl.org/dc/terms/"/>
-    <ds:schemaRef ds:uri="http://schemas.microsoft.com/office/2006/documentManagement/types"/>
-    <ds:schemaRef ds:uri="http://schemas.microsoft.com/office/infopath/2007/PartnerControls"/>
-    <ds:schemaRef ds:uri="http://schemas.openxmlformats.org/package/2006/metadata/core-properties"/>
-    <ds:schemaRef ds:uri="1df0befc-070f-4a10-a943-42500e74392a"/>
-    <ds:schemaRef ds:uri="http://purl.org/dc/dcmitype/"/>
-  </ds:schemaRefs>
-</ds:datastoreItem>
-</file>
-
-<file path=customXml/itemProps3.xml><?xml version="1.0" encoding="utf-8"?>
-<ds:datastoreItem xmlns:ds="http://schemas.openxmlformats.org/officeDocument/2006/customXml" ds:itemID="{419EA632-356F-46CA-A403-CA6A6CF0F6C1}">
-  <ds:schemaRefs>
-    <ds:schemaRef ds:uri="http://schemas.microsoft.com/sharepoint/v3/contenttype/forms"/>
-  </ds:schemaRefs>
-</ds:datastoreItem>
 </file>
</xml_diff>